<commit_message>
maybe slide deck final
</commit_message>
<xml_diff>
--- a/Slide deck.pptx
+++ b/Slide deck.pptx
@@ -346,6 +346,18 @@
   <p:clrMapOvr>
     <a:overrideClrMapping bg1="dk1" tx1="lt1" bg2="dk2" tx2="lt2" accent1="accent1" accent2="accent2" accent3="accent3" accent4="accent4" accent5="accent5" accent6="accent6" hlink="hlink" folHlink="folHlink"/>
   </p:clrMapOvr>
+  <mc:AlternateContent xmlns:mc="http://schemas.openxmlformats.org/markup-compatibility/2006">
+    <mc:Choice xmlns:p14="http://schemas.microsoft.com/office/powerpoint/2010/main" Requires="p14">
+      <p:transition spd="med" p14:dur="700">
+        <p:fade/>
+      </p:transition>
+    </mc:Choice>
+    <mc:Fallback>
+      <p:transition spd="med">
+        <p:fade/>
+      </p:transition>
+    </mc:Fallback>
+  </mc:AlternateContent>
   <p:timing>
     <p:tnLst>
       <p:par>
@@ -523,6 +535,18 @@
   <p:clrMapOvr>
     <a:masterClrMapping/>
   </p:clrMapOvr>
+  <mc:AlternateContent xmlns:mc="http://schemas.openxmlformats.org/markup-compatibility/2006">
+    <mc:Choice xmlns:p14="http://schemas.microsoft.com/office/powerpoint/2010/main" Requires="p14">
+      <p:transition spd="med" p14:dur="700">
+        <p:fade/>
+      </p:transition>
+    </mc:Choice>
+    <mc:Fallback>
+      <p:transition spd="med">
+        <p:fade/>
+      </p:transition>
+    </mc:Fallback>
+  </mc:AlternateContent>
   <p:timing>
     <p:tnLst>
       <p:par>
@@ -710,6 +734,18 @@
   <p:clrMapOvr>
     <a:masterClrMapping/>
   </p:clrMapOvr>
+  <mc:AlternateContent xmlns:mc="http://schemas.openxmlformats.org/markup-compatibility/2006">
+    <mc:Choice xmlns:p14="http://schemas.microsoft.com/office/powerpoint/2010/main" Requires="p14">
+      <p:transition spd="med" p14:dur="700">
+        <p:fade/>
+      </p:transition>
+    </mc:Choice>
+    <mc:Fallback>
+      <p:transition spd="med">
+        <p:fade/>
+      </p:transition>
+    </mc:Fallback>
+  </mc:AlternateContent>
   <p:timing>
     <p:tnLst>
       <p:par>
@@ -887,6 +923,18 @@
   <p:clrMapOvr>
     <a:masterClrMapping/>
   </p:clrMapOvr>
+  <mc:AlternateContent xmlns:mc="http://schemas.openxmlformats.org/markup-compatibility/2006">
+    <mc:Choice xmlns:p14="http://schemas.microsoft.com/office/powerpoint/2010/main" Requires="p14">
+      <p:transition spd="med" p14:dur="700">
+        <p:fade/>
+      </p:transition>
+    </mc:Choice>
+    <mc:Fallback>
+      <p:transition spd="med">
+        <p:fade/>
+      </p:transition>
+    </mc:Fallback>
+  </mc:AlternateContent>
   <p:timing>
     <p:tnLst>
       <p:par>
@@ -1162,6 +1210,18 @@
   <p:clrMapOvr>
     <a:overrideClrMapping bg1="dk1" tx1="lt1" bg2="dk2" tx2="lt2" accent1="accent1" accent2="accent2" accent3="accent3" accent4="accent4" accent5="accent5" accent6="accent6" hlink="hlink" folHlink="folHlink"/>
   </p:clrMapOvr>
+  <mc:AlternateContent xmlns:mc="http://schemas.openxmlformats.org/markup-compatibility/2006">
+    <mc:Choice xmlns:p14="http://schemas.microsoft.com/office/powerpoint/2010/main" Requires="p14">
+      <p:transition spd="med" p14:dur="700">
+        <p:fade/>
+      </p:transition>
+    </mc:Choice>
+    <mc:Fallback>
+      <p:transition spd="med">
+        <p:fade/>
+      </p:transition>
+    </mc:Fallback>
+  </mc:AlternateContent>
   <p:timing>
     <p:tnLst>
       <p:par>
@@ -1401,6 +1461,18 @@
   <p:clrMapOvr>
     <a:masterClrMapping/>
   </p:clrMapOvr>
+  <mc:AlternateContent xmlns:mc="http://schemas.openxmlformats.org/markup-compatibility/2006">
+    <mc:Choice xmlns:p14="http://schemas.microsoft.com/office/powerpoint/2010/main" Requires="p14">
+      <p:transition spd="med" p14:dur="700">
+        <p:fade/>
+      </p:transition>
+    </mc:Choice>
+    <mc:Fallback>
+      <p:transition spd="med">
+        <p:fade/>
+      </p:transition>
+    </mc:Fallback>
+  </mc:AlternateContent>
   <p:timing>
     <p:tnLst>
       <p:par>
@@ -1790,6 +1862,18 @@
   <p:clrMapOvr>
     <a:masterClrMapping/>
   </p:clrMapOvr>
+  <mc:AlternateContent xmlns:mc="http://schemas.openxmlformats.org/markup-compatibility/2006">
+    <mc:Choice xmlns:p14="http://schemas.microsoft.com/office/powerpoint/2010/main" Requires="p14">
+      <p:transition spd="med" p14:dur="700">
+        <p:fade/>
+      </p:transition>
+    </mc:Choice>
+    <mc:Fallback>
+      <p:transition spd="med">
+        <p:fade/>
+      </p:transition>
+    </mc:Fallback>
+  </mc:AlternateContent>
   <p:timing>
     <p:tnLst>
       <p:par>
@@ -1915,6 +1999,18 @@
   <p:clrMapOvr>
     <a:masterClrMapping/>
   </p:clrMapOvr>
+  <mc:AlternateContent xmlns:mc="http://schemas.openxmlformats.org/markup-compatibility/2006">
+    <mc:Choice xmlns:p14="http://schemas.microsoft.com/office/powerpoint/2010/main" Requires="p14">
+      <p:transition spd="med" p14:dur="700">
+        <p:fade/>
+      </p:transition>
+    </mc:Choice>
+    <mc:Fallback>
+      <p:transition spd="med">
+        <p:fade/>
+      </p:transition>
+    </mc:Fallback>
+  </mc:AlternateContent>
   <p:timing>
     <p:tnLst>
       <p:par>
@@ -2017,6 +2113,18 @@
   <p:clrMapOvr>
     <a:masterClrMapping/>
   </p:clrMapOvr>
+  <mc:AlternateContent xmlns:mc="http://schemas.openxmlformats.org/markup-compatibility/2006">
+    <mc:Choice xmlns:p14="http://schemas.microsoft.com/office/powerpoint/2010/main" Requires="p14">
+      <p:transition spd="med" p14:dur="700">
+        <p:fade/>
+      </p:transition>
+    </mc:Choice>
+    <mc:Fallback>
+      <p:transition spd="med">
+        <p:fade/>
+      </p:transition>
+    </mc:Fallback>
+  </mc:AlternateContent>
   <p:timing>
     <p:tnLst>
       <p:par>
@@ -2396,6 +2504,18 @@
   <p:clrMapOvr>
     <a:masterClrMapping/>
   </p:clrMapOvr>
+  <mc:AlternateContent xmlns:mc="http://schemas.openxmlformats.org/markup-compatibility/2006">
+    <mc:Choice xmlns:p14="http://schemas.microsoft.com/office/powerpoint/2010/main" Requires="p14">
+      <p:transition spd="med" p14:dur="700">
+        <p:fade/>
+      </p:transition>
+    </mc:Choice>
+    <mc:Fallback>
+      <p:transition spd="med">
+        <p:fade/>
+      </p:transition>
+    </mc:Fallback>
+  </mc:AlternateContent>
   <p:timing>
     <p:tnLst>
       <p:par>
@@ -2760,6 +2880,18 @@
   <p:clrMapOvr>
     <a:masterClrMapping/>
   </p:clrMapOvr>
+  <mc:AlternateContent xmlns:mc="http://schemas.openxmlformats.org/markup-compatibility/2006">
+    <mc:Choice xmlns:p14="http://schemas.microsoft.com/office/powerpoint/2010/main" Requires="p14">
+      <p:transition spd="med" p14:dur="700">
+        <p:fade/>
+      </p:transition>
+    </mc:Choice>
+    <mc:Fallback>
+      <p:transition spd="med">
+        <p:fade/>
+      </p:transition>
+    </mc:Fallback>
+  </mc:AlternateContent>
   <p:timing>
     <p:tnLst>
       <p:par>
@@ -3045,14 +3177,14 @@
     <p:sldLayoutId id="2147483796" r:id="rId10"/>
     <p:sldLayoutId id="2147483797" r:id="rId11"/>
   </p:sldLayoutIdLst>
-  <mc:AlternateContent xmlns:mc="http://schemas.openxmlformats.org/markup-compatibility/2006" xmlns:p15="http://schemas.microsoft.com/office/powerpoint/2012/main">
-    <mc:Choice Requires="p15">
-      <p:transition spd="slow">
-        <p15:prstTrans prst="fallOver"/>
+  <mc:AlternateContent xmlns:mc="http://schemas.openxmlformats.org/markup-compatibility/2006">
+    <mc:Choice xmlns:p14="http://schemas.microsoft.com/office/powerpoint/2010/main" Requires="p14">
+      <p:transition spd="med" p14:dur="700">
+        <p:fade/>
       </p:transition>
     </mc:Choice>
-    <mc:Fallback xmlns="">
-      <p:transition spd="slow">
+    <mc:Fallback>
+      <p:transition spd="med">
         <p:fade/>
       </p:transition>
     </mc:Fallback>
@@ -3386,7 +3518,7 @@
       </a:lvl9pPr>
     </p:otherStyle>
   </p:txStyles>
-  <p:extLst>
+  <p:extLst mod="1">
     <p:ext uri="{27BBF7A9-308A-43DC-89C8-2F10F3537804}">
       <p15:sldGuideLst xmlns:p15="http://schemas.microsoft.com/office/powerpoint/2012/main"/>
     </p:ext>
@@ -3746,6 +3878,25 @@
   <p:clrMapOvr>
     <a:masterClrMapping/>
   </p:clrMapOvr>
+  <mc:AlternateContent xmlns:mc="http://schemas.openxmlformats.org/markup-compatibility/2006">
+    <mc:Choice xmlns:p14="http://schemas.microsoft.com/office/powerpoint/2010/main" Requires="p14">
+      <p:transition spd="med" p14:dur="700">
+        <p:fade/>
+      </p:transition>
+    </mc:Choice>
+    <mc:Fallback>
+      <p:transition spd="med">
+        <p:fade/>
+      </p:transition>
+    </mc:Fallback>
+  </mc:AlternateContent>
+  <p:timing>
+    <p:tnLst>
+      <p:par>
+        <p:cTn id="1" dur="indefinite" restart="never" nodeType="tmRoot"/>
+      </p:par>
+    </p:tnLst>
+  </p:timing>
 </p:sld>
 </file>
 
@@ -3781,7 +3932,7 @@
           <p:cNvPr id="3" name="Retângulo 1">
             <a:extLst>
               <a:ext uri="{FF2B5EF4-FFF2-40B4-BE49-F238E27FC236}">
-                <a16:creationId xmlns:a16="http://schemas.microsoft.com/office/drawing/2014/main" xmlns="" id="{26BBB161-7054-4038-A56F-27C7633C8DB9}"/>
+                <a16:creationId xmlns="" xmlns:a16="http://schemas.microsoft.com/office/drawing/2014/main" id="{26BBB161-7054-4038-A56F-27C7633C8DB9}"/>
               </a:ext>
             </a:extLst>
           </p:cNvPr>
@@ -3817,42 +3968,96 @@
             </a:r>
             <a:r>
               <a:rPr lang="en-US" sz="2000" dirty="0">
+                <a:solidFill>
+                  <a:schemeClr val="tx2">
+                    <a:lumMod val="20000"/>
+                    <a:lumOff val="80000"/>
+                  </a:schemeClr>
+                </a:solidFill>
                 <a:cs typeface="Times New Roman" panose="02020603050405020304" pitchFamily="18" charset="0"/>
               </a:rPr>
               <a:t>Without a doubt, TSP is a software development strategy that differentiates from others because of the main role a </a:t>
             </a:r>
             <a:r>
               <a:rPr lang="en-US" sz="2000" b="1" dirty="0">
-                <a:cs typeface="Times New Roman" panose="02020603050405020304" pitchFamily="18" charset="0"/>
-              </a:rPr>
-              <a:t>team </a:t>
+                <a:solidFill>
+                  <a:srgbClr val="0070C0"/>
+                </a:solidFill>
+                <a:cs typeface="Times New Roman" panose="02020603050405020304" pitchFamily="18" charset="0"/>
+              </a:rPr>
+              <a:t>team</a:t>
+            </a:r>
+            <a:r>
+              <a:rPr lang="en-US" sz="2000" b="1" dirty="0">
+                <a:solidFill>
+                  <a:schemeClr val="tx2">
+                    <a:lumMod val="20000"/>
+                    <a:lumOff val="80000"/>
+                  </a:schemeClr>
+                </a:solidFill>
+                <a:cs typeface="Times New Roman" panose="02020603050405020304" pitchFamily="18" charset="0"/>
+              </a:rPr>
+              <a:t> </a:t>
             </a:r>
             <a:r>
               <a:rPr lang="en-US" sz="2000" dirty="0">
+                <a:solidFill>
+                  <a:schemeClr val="tx2">
+                    <a:lumMod val="20000"/>
+                    <a:lumOff val="80000"/>
+                  </a:schemeClr>
+                </a:solidFill>
                 <a:cs typeface="Times New Roman" panose="02020603050405020304" pitchFamily="18" charset="0"/>
               </a:rPr>
               <a:t>has in the software development. More than focusing on the individual, TSP forms a </a:t>
             </a:r>
             <a:r>
               <a:rPr lang="en-US" sz="2000" b="1" dirty="0">
+                <a:solidFill>
+                  <a:srgbClr val="0070C0"/>
+                </a:solidFill>
                 <a:cs typeface="Times New Roman" panose="02020603050405020304" pitchFamily="18" charset="0"/>
               </a:rPr>
               <a:t>strong team</a:t>
             </a:r>
             <a:r>
               <a:rPr lang="en-US" sz="2000" dirty="0">
-                <a:cs typeface="Times New Roman" panose="02020603050405020304" pitchFamily="18" charset="0"/>
-              </a:rPr>
-              <a:t> with well defined </a:t>
+                <a:solidFill>
+                  <a:srgbClr val="0070C0"/>
+                </a:solidFill>
+                <a:cs typeface="Times New Roman" panose="02020603050405020304" pitchFamily="18" charset="0"/>
+              </a:rPr>
+              <a:t> </a:t>
+            </a:r>
+            <a:r>
+              <a:rPr lang="en-US" sz="2000" dirty="0">
+                <a:solidFill>
+                  <a:schemeClr val="tx2">
+                    <a:lumMod val="20000"/>
+                    <a:lumOff val="80000"/>
+                  </a:schemeClr>
+                </a:solidFill>
+                <a:cs typeface="Times New Roman" panose="02020603050405020304" pitchFamily="18" charset="0"/>
+              </a:rPr>
+              <a:t>with well defined </a:t>
             </a:r>
             <a:r>
               <a:rPr lang="en-US" sz="2000" b="1" dirty="0">
+                <a:solidFill>
+                  <a:srgbClr val="0070C0"/>
+                </a:solidFill>
                 <a:cs typeface="Times New Roman" panose="02020603050405020304" pitchFamily="18" charset="0"/>
               </a:rPr>
               <a:t>roles</a:t>
             </a:r>
             <a:r>
               <a:rPr lang="en-US" sz="2000" dirty="0">
+                <a:solidFill>
+                  <a:schemeClr val="tx2">
+                    <a:lumMod val="20000"/>
+                    <a:lumOff val="80000"/>
+                  </a:schemeClr>
+                </a:solidFill>
                 <a:cs typeface="Times New Roman" panose="02020603050405020304" pitchFamily="18" charset="0"/>
               </a:rPr>
               <a:t>, in order to produce the </a:t>
@@ -3877,17 +4082,35 @@
             </a:r>
             <a:r>
               <a:rPr lang="en-US" sz="2000" dirty="0">
+                <a:solidFill>
+                  <a:schemeClr val="tx2">
+                    <a:lumMod val="20000"/>
+                    <a:lumOff val="80000"/>
+                  </a:schemeClr>
+                </a:solidFill>
                 <a:cs typeface="Times New Roman" panose="02020603050405020304" pitchFamily="18" charset="0"/>
               </a:rPr>
               <a:t>for the clients it attends</a:t>
             </a:r>
             <a:r>
               <a:rPr lang="en-US" sz="2000" dirty="0" smtClean="0">
+                <a:solidFill>
+                  <a:schemeClr val="tx2">
+                    <a:lumMod val="20000"/>
+                    <a:lumOff val="80000"/>
+                  </a:schemeClr>
+                </a:solidFill>
                 <a:cs typeface="Times New Roman" panose="02020603050405020304" pitchFamily="18" charset="0"/>
               </a:rPr>
               <a:t>.</a:t>
             </a:r>
             <a:endParaRPr lang="en-US" sz="2000" dirty="0">
+              <a:solidFill>
+                <a:schemeClr val="tx2">
+                  <a:lumMod val="20000"/>
+                  <a:lumOff val="80000"/>
+                </a:schemeClr>
+              </a:solidFill>
               <a:cs typeface="Times New Roman" panose="02020603050405020304" pitchFamily="18" charset="0"/>
             </a:endParaRPr>
           </a:p>
@@ -3903,6 +4126,25 @@
   <p:clrMapOvr>
     <a:masterClrMapping/>
   </p:clrMapOvr>
+  <mc:AlternateContent xmlns:mc="http://schemas.openxmlformats.org/markup-compatibility/2006">
+    <mc:Choice xmlns:p14="http://schemas.microsoft.com/office/powerpoint/2010/main" Requires="p14">
+      <p:transition spd="med" p14:dur="700">
+        <p:fade/>
+      </p:transition>
+    </mc:Choice>
+    <mc:Fallback>
+      <p:transition spd="med">
+        <p:fade/>
+      </p:transition>
+    </mc:Fallback>
+  </mc:AlternateContent>
+  <p:timing>
+    <p:tnLst>
+      <p:par>
+        <p:cTn id="1" dur="indefinite" restart="never" nodeType="tmRoot"/>
+      </p:par>
+    </p:tnLst>
+  </p:timing>
 </p:sld>
 </file>
 
@@ -3912,9 +4154,7 @@
     <p:bg>
       <p:bgPr>
         <a:solidFill>
-          <a:schemeClr val="tx2">
-            <a:lumMod val="75000"/>
-          </a:schemeClr>
+          <a:schemeClr val="tx1"/>
         </a:solidFill>
         <a:effectLst/>
       </p:bgPr>
@@ -4065,7 +4305,7 @@
           <p:cNvPr id="7" name="Picture 2" descr="Watts Humphrey.jpg">
             <a:extLst>
               <a:ext uri="{FF2B5EF4-FFF2-40B4-BE49-F238E27FC236}">
-                <a16:creationId xmlns:a16="http://schemas.microsoft.com/office/drawing/2014/main" xmlns="" id="{0E4F548F-BDF2-4B4F-ABD6-DCE652594426}"/>
+                <a16:creationId xmlns="" xmlns:a16="http://schemas.microsoft.com/office/drawing/2014/main" id="{0E4F548F-BDF2-4B4F-ABD6-DCE652594426}"/>
               </a:ext>
             </a:extLst>
           </p:cNvPr>
@@ -4109,10 +4349,77 @@
       </p:pic>
       <p:sp>
         <p:nvSpPr>
+          <p:cNvPr id="6" name="Title 1"/>
+          <p:cNvSpPr txBox="1">
+            <a:spLocks/>
+          </p:cNvSpPr>
+          <p:nvPr/>
+        </p:nvSpPr>
+        <p:spPr bwMode="blackWhite">
+          <a:xfrm>
+            <a:off x="6493397" y="930956"/>
+            <a:ext cx="5297784" cy="5215201"/>
+          </a:xfrm>
+          <a:prstGeom prst="rect">
+            <a:avLst/>
+          </a:prstGeom>
+          <a:noFill/>
+          <a:ln w="31750" cap="sq">
+            <a:solidFill>
+              <a:srgbClr val="00B0F0"/>
+            </a:solidFill>
+            <a:miter lim="800000"/>
+          </a:ln>
+        </p:spPr>
+        <p:txBody>
+          <a:bodyPr vert="horz" wrap="square" lIns="182880" tIns="182880" rIns="182880" bIns="182880" rtlCol="0" anchor="ctr" anchorCtr="1">
+            <a:noAutofit/>
+          </a:bodyPr>
+          <a:lstStyle>
+            <a:lvl1pPr algn="ctr" defTabSz="914400" rtl="0" eaLnBrk="1" latinLnBrk="0" hangingPunct="1">
+              <a:lnSpc>
+                <a:spcPct val="90000"/>
+              </a:lnSpc>
+              <a:spcBef>
+                <a:spcPct val="0"/>
+              </a:spcBef>
+              <a:buNone/>
+              <a:defRPr sz="2200" kern="1200" cap="all" spc="200" baseline="0">
+                <a:solidFill>
+                  <a:srgbClr val="262626"/>
+                </a:solidFill>
+                <a:latin typeface="+mj-lt"/>
+                <a:ea typeface="+mj-ea"/>
+                <a:cs typeface="+mj-cs"/>
+              </a:defRPr>
+            </a:lvl1pPr>
+          </a:lstStyle>
+          <a:p>
+            <a:r>
+              <a:rPr lang="en-US" sz="2000" b="1" cap="none" dirty="0" smtClean="0">
+                <a:solidFill>
+                  <a:schemeClr val="tx1"/>
+                </a:solidFill>
+                <a:latin typeface="Times New Roman" panose="02020603050405020304" pitchFamily="18" charset="0"/>
+                <a:cs typeface="Times New Roman" panose="02020603050405020304" pitchFamily="18" charset="0"/>
+              </a:rPr>
+              <a:t> </a:t>
+            </a:r>
+            <a:endParaRPr lang="en-US" sz="1800" cap="none" dirty="0">
+              <a:solidFill>
+                <a:schemeClr val="tx1"/>
+              </a:solidFill>
+              <a:latin typeface="+mn-lt"/>
+            </a:endParaRPr>
+          </a:p>
+        </p:txBody>
+      </p:sp>
+      <p:sp>
+        <p:nvSpPr>
           <p:cNvPr id="8" name="Retângulo 1">
             <a:extLst>
               <a:ext uri="{FF2B5EF4-FFF2-40B4-BE49-F238E27FC236}">
-                <a16:creationId xmlns:a16="http://schemas.microsoft.com/office/drawing/2014/main" xmlns="" id="{7583430B-F05F-49A8-8E4D-59900A6DFCD1}"/>
+                <a16:creationId xmlns="" xmlns:a16="http://schemas.microsoft.com/office/drawing/2014/main" id="{7583430B-F05F-49A8-8E4D-59900A6DFCD1}"/>
               </a:ext>
             </a:extLst>
           </p:cNvPr>
@@ -4134,14 +4441,43 @@
           </a:bodyPr>
           <a:lstStyle/>
           <a:p>
+            <a:pPr algn="r"/>
             <a:r>
               <a:rPr lang="pt-PT" dirty="0" smtClean="0">
+                <a:solidFill>
+                  <a:schemeClr val="tx2">
+                    <a:lumMod val="20000"/>
+                    <a:lumOff val="80000"/>
+                  </a:schemeClr>
+                </a:solidFill>
+                <a:effectLst>
+                  <a:glow rad="63500">
+                    <a:schemeClr val="accent2">
+                      <a:satMod val="175000"/>
+                      <a:alpha val="40000"/>
+                    </a:schemeClr>
+                  </a:glow>
+                </a:effectLst>
                 <a:latin typeface="Times New Roman" panose="02020603050405020304" pitchFamily="18" charset="0"/>
                 <a:cs typeface="Times New Roman" panose="02020603050405020304" pitchFamily="18" charset="0"/>
               </a:rPr>
               <a:t>Watts Humphrey</a:t>
             </a:r>
             <a:endParaRPr lang="pt-PT" dirty="0">
+              <a:solidFill>
+                <a:schemeClr val="tx2">
+                  <a:lumMod val="20000"/>
+                  <a:lumOff val="80000"/>
+                </a:schemeClr>
+              </a:solidFill>
+              <a:effectLst>
+                <a:glow rad="63500">
+                  <a:schemeClr val="accent2">
+                    <a:satMod val="175000"/>
+                    <a:alpha val="40000"/>
+                  </a:schemeClr>
+                </a:glow>
+              </a:effectLst>
               <a:latin typeface="Times New Roman" panose="02020603050405020304" pitchFamily="18" charset="0"/>
               <a:cs typeface="Times New Roman" panose="02020603050405020304" pitchFamily="18" charset="0"/>
             </a:endParaRPr>
@@ -4158,6 +4494,25 @@
   <p:clrMapOvr>
     <a:masterClrMapping/>
   </p:clrMapOvr>
+  <mc:AlternateContent xmlns:mc="http://schemas.openxmlformats.org/markup-compatibility/2006">
+    <mc:Choice xmlns:p14="http://schemas.microsoft.com/office/powerpoint/2010/main" Requires="p14">
+      <p:transition spd="med" p14:dur="700">
+        <p:fade/>
+      </p:transition>
+    </mc:Choice>
+    <mc:Fallback>
+      <p:transition spd="med">
+        <p:fade/>
+      </p:transition>
+    </mc:Fallback>
+  </mc:AlternateContent>
+  <p:timing>
+    <p:tnLst>
+      <p:par>
+        <p:cTn id="1" dur="indefinite" restart="never" nodeType="tmRoot"/>
+      </p:par>
+    </p:tnLst>
+  </p:timing>
 </p:sld>
 </file>
 
@@ -4193,7 +4548,7 @@
           <p:cNvPr id="2" name="Retângulo 3">
             <a:extLst>
               <a:ext uri="{FF2B5EF4-FFF2-40B4-BE49-F238E27FC236}">
-                <a16:creationId xmlns:a16="http://schemas.microsoft.com/office/drawing/2014/main" xmlns="" id="{9DD97C2F-5BE3-4D84-ADEF-242D0B018407}"/>
+                <a16:creationId xmlns="" xmlns:a16="http://schemas.microsoft.com/office/drawing/2014/main" id="{9DD97C2F-5BE3-4D84-ADEF-242D0B018407}"/>
               </a:ext>
             </a:extLst>
           </p:cNvPr>
@@ -4202,8 +4557,8 @@
         </p:nvSpPr>
         <p:spPr>
           <a:xfrm>
-            <a:off x="627299" y="1074696"/>
-            <a:ext cx="10877937" cy="4708981"/>
+            <a:off x="592575" y="438088"/>
+            <a:ext cx="10877937" cy="1307537"/>
           </a:xfrm>
           <a:prstGeom prst="rect">
             <a:avLst/>
@@ -4229,26 +4584,103 @@
             </a:r>
             <a:r>
               <a:rPr lang="en-GB" sz="2800" dirty="0" smtClean="0">
+                <a:solidFill>
+                  <a:schemeClr val="tx2">
+                    <a:lumMod val="20000"/>
+                    <a:lumOff val="80000"/>
+                  </a:schemeClr>
+                </a:solidFill>
                 <a:latin typeface="Times New Roman" panose="02020603050405020304" pitchFamily="18" charset="0"/>
                 <a:cs typeface="Times New Roman" panose="02020603050405020304" pitchFamily="18" charset="0"/>
               </a:rPr>
-              <a:t>TSP is a software development strategy that provides a well defined process framework designed to:</a:t>
+              <a:t>TSP is a software development strategy that provides a well defined process framework designed to</a:t>
+            </a:r>
+            <a:r>
+              <a:rPr lang="en-GB" sz="2800" dirty="0" smtClean="0">
+                <a:solidFill>
+                  <a:schemeClr val="tx2">
+                    <a:lumMod val="20000"/>
+                    <a:lumOff val="80000"/>
+                  </a:schemeClr>
+                </a:solidFill>
+                <a:latin typeface="Times New Roman" panose="02020603050405020304" pitchFamily="18" charset="0"/>
+                <a:cs typeface="Times New Roman" panose="02020603050405020304" pitchFamily="18" charset="0"/>
+              </a:rPr>
+              <a:t>:</a:t>
             </a:r>
             <a:endParaRPr lang="en-GB" sz="3200" dirty="0" smtClean="0">
+              <a:solidFill>
+                <a:schemeClr val="tx2">
+                  <a:lumMod val="20000"/>
+                  <a:lumOff val="80000"/>
+                </a:schemeClr>
+              </a:solidFill>
               <a:latin typeface="Times New Roman" panose="02020603050405020304" pitchFamily="18" charset="0"/>
               <a:cs typeface="Times New Roman" panose="02020603050405020304" pitchFamily="18" charset="0"/>
             </a:endParaRPr>
           </a:p>
-          <a:p>
-            <a:pPr indent="226800" algn="just">
+        </p:txBody>
+      </p:sp>
+      <p:sp>
+        <p:nvSpPr>
+          <p:cNvPr id="3" name="Rectangle 2"/>
+          <p:cNvSpPr/>
+          <p:nvPr/>
+        </p:nvSpPr>
+        <p:spPr>
+          <a:xfrm>
+            <a:off x="847126" y="2164465"/>
+            <a:ext cx="10368833" cy="3944567"/>
+          </a:xfrm>
+          <a:prstGeom prst="rect">
+            <a:avLst/>
+          </a:prstGeom>
+          <a:solidFill>
+            <a:srgbClr val="00B0F0">
+              <a:alpha val="50000"/>
+            </a:srgbClr>
+          </a:solidFill>
+          <a:ln>
+            <a:solidFill>
+              <a:srgbClr val="00B0F0"/>
+            </a:solidFill>
+          </a:ln>
+        </p:spPr>
+        <p:style>
+          <a:lnRef idx="2">
+            <a:schemeClr val="accent1">
+              <a:shade val="50000"/>
+            </a:schemeClr>
+          </a:lnRef>
+          <a:fillRef idx="1">
+            <a:schemeClr val="accent1"/>
+          </a:fillRef>
+          <a:effectRef idx="0">
+            <a:schemeClr val="accent1"/>
+          </a:effectRef>
+          <a:fontRef idx="minor">
+            <a:schemeClr val="lt1"/>
+          </a:fontRef>
+        </p:style>
+        <p:txBody>
+          <a:bodyPr rtlCol="0" anchor="ctr"/>
+          <a:lstStyle/>
+          <a:p>
+            <a:pPr marL="457200" indent="-457200" algn="just">
               <a:lnSpc>
                 <a:spcPct val="150000"/>
               </a:lnSpc>
-              <a:buFont typeface="Courier New" charset="0"/>
-              <a:buChar char="o"/>
+              <a:buFont typeface="Wingdings" charset="2"/>
+              <a:buChar char="§"/>
             </a:pPr>
             <a:r>
-              <a:rPr lang="en-GB" sz="2400" dirty="0" smtClean="0">
+              <a:rPr lang="en-GB" sz="2800" dirty="0">
+                <a:solidFill>
+                  <a:schemeClr val="tx2">
+                    <a:lumMod val="20000"/>
+                    <a:lumOff val="80000"/>
+                  </a:schemeClr>
+                </a:solidFill>
                 <a:latin typeface="Times New Roman" panose="02020603050405020304" pitchFamily="18" charset="0"/>
                 <a:cs typeface="Times New Roman" panose="02020603050405020304" pitchFamily="18" charset="0"/>
               </a:rPr>
@@ -4256,15 +4688,21 @@
             </a:r>
           </a:p>
           <a:p>
-            <a:pPr indent="226800" algn="just">
+            <a:pPr marL="457200" indent="-457200" algn="just">
               <a:lnSpc>
                 <a:spcPct val="150000"/>
               </a:lnSpc>
-              <a:buFont typeface="Courier New" charset="0"/>
-              <a:buChar char="o"/>
+              <a:buFont typeface="Wingdings" charset="2"/>
+              <a:buChar char="§"/>
             </a:pPr>
             <a:r>
-              <a:rPr lang="en-GB" sz="2400" dirty="0" smtClean="0">
+              <a:rPr lang="en-GB" sz="2800" dirty="0">
+                <a:solidFill>
+                  <a:schemeClr val="tx2">
+                    <a:lumMod val="20000"/>
+                    <a:lumOff val="80000"/>
+                  </a:schemeClr>
+                </a:solidFill>
                 <a:latin typeface="Times New Roman" panose="02020603050405020304" pitchFamily="18" charset="0"/>
                 <a:cs typeface="Times New Roman" panose="02020603050405020304" pitchFamily="18" charset="0"/>
               </a:rPr>
@@ -4272,15 +4710,21 @@
             </a:r>
           </a:p>
           <a:p>
-            <a:pPr indent="226800" algn="just">
+            <a:pPr marL="457200" indent="-457200" algn="just">
               <a:lnSpc>
                 <a:spcPct val="150000"/>
               </a:lnSpc>
-              <a:buFont typeface="Courier New" charset="0"/>
-              <a:buChar char="o"/>
+              <a:buFont typeface="Wingdings" charset="2"/>
+              <a:buChar char="§"/>
             </a:pPr>
             <a:r>
-              <a:rPr lang="en-GB" sz="2400" dirty="0" smtClean="0">
+              <a:rPr lang="en-GB" sz="2800" dirty="0">
+                <a:solidFill>
+                  <a:schemeClr val="tx2">
+                    <a:lumMod val="20000"/>
+                    <a:lumOff val="80000"/>
+                  </a:schemeClr>
+                </a:solidFill>
                 <a:latin typeface="Times New Roman" panose="02020603050405020304" pitchFamily="18" charset="0"/>
                 <a:cs typeface="Times New Roman" panose="02020603050405020304" pitchFamily="18" charset="0"/>
               </a:rPr>
@@ -4288,15 +4732,21 @@
             </a:r>
           </a:p>
           <a:p>
-            <a:pPr indent="226800" algn="just">
+            <a:pPr marL="457200" indent="-457200" algn="just">
               <a:lnSpc>
                 <a:spcPct val="150000"/>
               </a:lnSpc>
-              <a:buFont typeface="Courier New" charset="0"/>
-              <a:buChar char="o"/>
+              <a:buFont typeface="Wingdings" charset="2"/>
+              <a:buChar char="§"/>
             </a:pPr>
             <a:r>
-              <a:rPr lang="en-GB" sz="2400" dirty="0" smtClean="0">
+              <a:rPr lang="en-GB" sz="2800" dirty="0">
+                <a:solidFill>
+                  <a:schemeClr val="tx2">
+                    <a:lumMod val="20000"/>
+                    <a:lumOff val="80000"/>
+                  </a:schemeClr>
+                </a:solidFill>
                 <a:latin typeface="Times New Roman" panose="02020603050405020304" pitchFamily="18" charset="0"/>
                 <a:cs typeface="Times New Roman" panose="02020603050405020304" pitchFamily="18" charset="0"/>
               </a:rPr>
@@ -4304,21 +4754,46 @@
             </a:r>
           </a:p>
           <a:p>
-            <a:pPr indent="226800" algn="just">
+            <a:pPr marL="457200" indent="-457200" algn="just">
               <a:lnSpc>
                 <a:spcPct val="150000"/>
               </a:lnSpc>
-              <a:buFont typeface="Courier New" charset="0"/>
-              <a:buChar char="o"/>
+              <a:buFont typeface="Wingdings" charset="2"/>
+              <a:buChar char="§"/>
             </a:pPr>
             <a:r>
-              <a:rPr lang="en-GB" sz="2400" dirty="0" smtClean="0">
+              <a:rPr lang="en-GB" sz="2800" dirty="0" smtClean="0">
+                <a:solidFill>
+                  <a:schemeClr val="tx2">
+                    <a:lumMod val="20000"/>
+                    <a:lumOff val="80000"/>
+                  </a:schemeClr>
+                </a:solidFill>
                 <a:latin typeface="Times New Roman" panose="02020603050405020304" pitchFamily="18" charset="0"/>
                 <a:cs typeface="Times New Roman" panose="02020603050405020304" pitchFamily="18" charset="0"/>
               </a:rPr>
-              <a:t>produce software products in a way that improves the quality and productivity of the team.</a:t>
-            </a:r>
-            <a:endParaRPr lang="en-GB" sz="2400" dirty="0">
+              <a:t>produce </a:t>
+            </a:r>
+            <a:r>
+              <a:rPr lang="en-GB" sz="2800" dirty="0">
+                <a:solidFill>
+                  <a:schemeClr val="tx2">
+                    <a:lumMod val="20000"/>
+                    <a:lumOff val="80000"/>
+                  </a:schemeClr>
+                </a:solidFill>
+                <a:latin typeface="Times New Roman" panose="02020603050405020304" pitchFamily="18" charset="0"/>
+                <a:cs typeface="Times New Roman" panose="02020603050405020304" pitchFamily="18" charset="0"/>
+              </a:rPr>
+              <a:t>software products in a way that improves the quality and productivity of the team.</a:t>
+            </a:r>
+            <a:endParaRPr lang="en-GB" sz="2800" dirty="0">
+              <a:solidFill>
+                <a:schemeClr val="tx2">
+                  <a:lumMod val="20000"/>
+                  <a:lumOff val="80000"/>
+                </a:schemeClr>
+              </a:solidFill>
               <a:latin typeface="Times New Roman" panose="02020603050405020304" pitchFamily="18" charset="0"/>
               <a:cs typeface="Times New Roman" panose="02020603050405020304" pitchFamily="18" charset="0"/>
             </a:endParaRPr>
@@ -4335,6 +4810,25 @@
   <p:clrMapOvr>
     <a:masterClrMapping/>
   </p:clrMapOvr>
+  <mc:AlternateContent xmlns:mc="http://schemas.openxmlformats.org/markup-compatibility/2006">
+    <mc:Choice xmlns:p14="http://schemas.microsoft.com/office/powerpoint/2010/main" Requires="p14">
+      <p:transition spd="med" p14:dur="700">
+        <p:fade/>
+      </p:transition>
+    </mc:Choice>
+    <mc:Fallback>
+      <p:transition spd="med">
+        <p:fade/>
+      </p:transition>
+    </mc:Fallback>
+  </mc:AlternateContent>
+  <p:timing>
+    <p:tnLst>
+      <p:par>
+        <p:cTn id="1" dur="indefinite" restart="never" nodeType="tmRoot"/>
+      </p:par>
+    </p:tnLst>
+  </p:timing>
 </p:sld>
 </file>
 
@@ -4344,9 +4838,7 @@
     <p:bg>
       <p:bgPr>
         <a:solidFill>
-          <a:schemeClr val="tx2">
-            <a:lumMod val="75000"/>
-          </a:schemeClr>
+          <a:schemeClr val="tx1"/>
         </a:solidFill>
         <a:effectLst/>
       </p:bgPr>
@@ -4367,6 +4859,73 @@
       </p:grpSpPr>
       <p:sp>
         <p:nvSpPr>
+          <p:cNvPr id="5" name="Title 1"/>
+          <p:cNvSpPr txBox="1">
+            <a:spLocks/>
+          </p:cNvSpPr>
+          <p:nvPr/>
+        </p:nvSpPr>
+        <p:spPr bwMode="blackWhite">
+          <a:xfrm>
+            <a:off x="5150734" y="930956"/>
+            <a:ext cx="6620720" cy="4810087"/>
+          </a:xfrm>
+          <a:prstGeom prst="rect">
+            <a:avLst/>
+          </a:prstGeom>
+          <a:noFill/>
+          <a:ln w="31750" cap="sq">
+            <a:solidFill>
+              <a:srgbClr val="00B0F0"/>
+            </a:solidFill>
+            <a:miter lim="800000"/>
+          </a:ln>
+        </p:spPr>
+        <p:txBody>
+          <a:bodyPr vert="horz" wrap="square" lIns="182880" tIns="182880" rIns="182880" bIns="182880" rtlCol="0" anchor="ctr" anchorCtr="1">
+            <a:noAutofit/>
+          </a:bodyPr>
+          <a:lstStyle>
+            <a:lvl1pPr algn="ctr" defTabSz="914400" rtl="0" eaLnBrk="1" latinLnBrk="0" hangingPunct="1">
+              <a:lnSpc>
+                <a:spcPct val="90000"/>
+              </a:lnSpc>
+              <a:spcBef>
+                <a:spcPct val="0"/>
+              </a:spcBef>
+              <a:buNone/>
+              <a:defRPr sz="2200" kern="1200" cap="all" spc="200" baseline="0">
+                <a:solidFill>
+                  <a:srgbClr val="262626"/>
+                </a:solidFill>
+                <a:latin typeface="+mj-lt"/>
+                <a:ea typeface="+mj-ea"/>
+                <a:cs typeface="+mj-cs"/>
+              </a:defRPr>
+            </a:lvl1pPr>
+          </a:lstStyle>
+          <a:p>
+            <a:r>
+              <a:rPr lang="en-US" sz="2000" b="1" cap="none" dirty="0" smtClean="0">
+                <a:solidFill>
+                  <a:schemeClr val="tx1"/>
+                </a:solidFill>
+                <a:latin typeface="Times New Roman" panose="02020603050405020304" pitchFamily="18" charset="0"/>
+                <a:cs typeface="Times New Roman" panose="02020603050405020304" pitchFamily="18" charset="0"/>
+              </a:rPr>
+              <a:t> </a:t>
+            </a:r>
+            <a:endParaRPr lang="en-US" sz="1800" cap="none" dirty="0">
+              <a:solidFill>
+                <a:schemeClr val="tx1"/>
+              </a:solidFill>
+              <a:latin typeface="+mn-lt"/>
+            </a:endParaRPr>
+          </a:p>
+        </p:txBody>
+      </p:sp>
+      <p:sp>
+        <p:nvSpPr>
           <p:cNvPr id="2" name="Title 1"/>
           <p:cNvSpPr>
             <a:spLocks noGrp="1"/>
@@ -4377,8 +4936,8 @@
         </p:nvSpPr>
         <p:spPr>
           <a:xfrm>
-            <a:off x="1189171" y="1019696"/>
-            <a:ext cx="3363974" cy="4704037"/>
+            <a:off x="1189171" y="1707240"/>
+            <a:ext cx="3363974" cy="3443520"/>
           </a:xfrm>
           <a:noFill/>
           <a:ln>
@@ -4400,7 +4959,23 @@
                   <a:schemeClr val="tx1"/>
                 </a:solidFill>
               </a:rPr>
-              <a:t>To really understand TSP, engineers must be trained in the personal software process (PSP), in which they learn how to gather and use process data, make detailed plans, manage product quality as well as using earned value to find a project. The main elements of TSP can be summarize in this figure:</a:t>
+              <a:t>To really understand TSP, engineers must be trained in the personal software process (PSP), in which they learn how to gather and use process data, make detailed plans, manage product quality as well as using earned value to find a </a:t>
+            </a:r>
+            <a:r>
+              <a:rPr lang="en-US" sz="2000" cap="none">
+                <a:solidFill>
+                  <a:schemeClr val="tx1"/>
+                </a:solidFill>
+              </a:rPr>
+              <a:t>project</a:t>
+            </a:r>
+            <a:r>
+              <a:rPr lang="en-US" sz="2000" cap="none" smtClean="0">
+                <a:solidFill>
+                  <a:schemeClr val="tx1"/>
+                </a:solidFill>
+              </a:rPr>
+              <a:t>.</a:t>
             </a:r>
             <a:endParaRPr lang="en-US" sz="1800" cap="none" dirty="0">
               <a:solidFill>
@@ -4410,138 +4985,252 @@
           </a:p>
         </p:txBody>
       </p:sp>
-      <p:pic>
-        <p:nvPicPr>
-          <p:cNvPr id="6" name="Picture 2" descr="https://lh5.googleusercontent.com/ysH9A8mefCRWuAe_Kie6PaUZtKcVV7zZ7yZ355pqe10Am7URaBBxzmZr7JFXqNMBUYbiujbviGit9ZxH_-Tv8kWkc05mV1E0LsuIBRsP3KyfbIiFMeraF9ZlbmaKuioxIFQ62iwa">
+      <p:grpSp>
+        <p:nvGrpSpPr>
+          <p:cNvPr id="3" name="Group 2"/>
+          <p:cNvGrpSpPr/>
+          <p:nvPr/>
+        </p:nvGrpSpPr>
+        <p:grpSpPr>
+          <a:xfrm>
+            <a:off x="5297763" y="1137357"/>
+            <a:ext cx="6250770" cy="4813486"/>
+            <a:chOff x="5297763" y="1137357"/>
+            <a:chExt cx="6250770" cy="4813486"/>
+          </a:xfrm>
+        </p:grpSpPr>
+        <p:pic>
+          <p:nvPicPr>
+            <p:cNvPr id="6" name="Picture 2" descr="https://lh5.googleusercontent.com/ysH9A8mefCRWuAe_Kie6PaUZtKcVV7zZ7yZ355pqe10Am7URaBBxzmZr7JFXqNMBUYbiujbviGit9ZxH_-Tv8kWkc05mV1E0LsuIBRsP3KyfbIiFMeraF9ZlbmaKuioxIFQ62iwa">
+              <a:extLst>
+                <a:ext uri="{FF2B5EF4-FFF2-40B4-BE49-F238E27FC236}">
+                  <a16:creationId xmlns="" xmlns:a16="http://schemas.microsoft.com/office/drawing/2014/main" id="{E572AA55-79E7-4F0A-86F4-94B5C051CD23}"/>
+                </a:ext>
+              </a:extLst>
+            </p:cNvPr>
+            <p:cNvPicPr>
+              <a:picLocks noChangeAspect="1" noChangeArrowheads="1"/>
+            </p:cNvPicPr>
+            <p:nvPr/>
+          </p:nvPicPr>
+          <p:blipFill>
+            <a:blip r:embed="rId2">
+              <a:extLst>
+                <a:ext uri="{BEBA8EAE-BF5A-486C-A8C5-ECC9F3942E4B}">
+                  <a14:imgProps xmlns:a14="http://schemas.microsoft.com/office/drawing/2010/main">
+                    <a14:imgLayer r:embed="rId3">
+                      <a14:imgEffect>
+                        <a14:saturation sat="0"/>
+                      </a14:imgEffect>
+                    </a14:imgLayer>
+                  </a14:imgProps>
+                </a:ext>
+                <a:ext uri="{28A0092B-C50C-407E-A947-70E740481C1C}">
+                  <a14:useLocalDpi xmlns:a14="http://schemas.microsoft.com/office/drawing/2010/main" val="0"/>
+                </a:ext>
+              </a:extLst>
+            </a:blip>
+            <a:srcRect/>
+            <a:stretch>
+              <a:fillRect/>
+            </a:stretch>
+          </p:blipFill>
+          <p:spPr bwMode="auto">
+            <a:xfrm>
+              <a:off x="5297763" y="1137357"/>
+              <a:ext cx="6250769" cy="4422419"/>
+            </a:xfrm>
+            <a:prstGeom prst="rect">
+              <a:avLst/>
+            </a:prstGeom>
+            <a:noFill/>
             <a:extLst>
-              <a:ext uri="{FF2B5EF4-FFF2-40B4-BE49-F238E27FC236}">
-                <a16:creationId xmlns:a16="http://schemas.microsoft.com/office/drawing/2014/main" xmlns="" id="{E572AA55-79E7-4F0A-86F4-94B5C051CD23}"/>
+              <a:ext uri="{909E8E84-426E-40DD-AFC4-6F175D3DCCD1}">
+                <a14:hiddenFill xmlns:a14="http://schemas.microsoft.com/office/drawing/2010/main">
+                  <a:solidFill>
+                    <a:srgbClr val="FFFFFF"/>
+                  </a:solidFill>
+                </a14:hiddenFill>
               </a:ext>
             </a:extLst>
-          </p:cNvPr>
-          <p:cNvPicPr>
-            <a:picLocks noChangeAspect="1" noChangeArrowheads="1"/>
-          </p:cNvPicPr>
-          <p:nvPr/>
-        </p:nvPicPr>
-        <p:blipFill>
-          <a:blip r:embed="rId2">
-            <a:extLst>
-              <a:ext uri="{BEBA8EAE-BF5A-486C-A8C5-ECC9F3942E4B}">
-                <a14:imgProps xmlns:a14="http://schemas.microsoft.com/office/drawing/2010/main">
-                  <a14:imgLayer r:embed="rId3">
-                    <a14:imgEffect>
-                      <a14:saturation sat="0"/>
-                    </a14:imgEffect>
-                  </a14:imgLayer>
-                </a14:imgProps>
-              </a:ext>
-              <a:ext uri="{28A0092B-C50C-407E-A947-70E740481C1C}">
-                <a14:useLocalDpi xmlns:a14="http://schemas.microsoft.com/office/drawing/2010/main" val="0"/>
-              </a:ext>
-            </a:extLst>
-          </a:blip>
-          <a:srcRect/>
-          <a:stretch>
-            <a:fillRect/>
-          </a:stretch>
-        </p:blipFill>
-        <p:spPr bwMode="auto">
-          <a:xfrm>
-            <a:off x="5297763" y="1137357"/>
-            <a:ext cx="6250769" cy="4422419"/>
-          </a:xfrm>
-          <a:prstGeom prst="rect">
-            <a:avLst/>
-          </a:prstGeom>
-          <a:noFill/>
-          <a:extLst>
-            <a:ext uri="{909E8E84-426E-40DD-AFC4-6F175D3DCCD1}">
-              <a14:hiddenFill xmlns:a14="http://schemas.microsoft.com/office/drawing/2010/main">
-                <a:solidFill>
-                  <a:srgbClr val="FFFFFF"/>
-                </a:solidFill>
-              </a14:hiddenFill>
-            </a:ext>
-          </a:extLst>
-        </p:spPr>
-      </p:pic>
-      <p:sp>
-        <p:nvSpPr>
-          <p:cNvPr id="8" name="Retângulo 1">
-            <a:extLst>
-              <a:ext uri="{FF2B5EF4-FFF2-40B4-BE49-F238E27FC236}">
-                <a16:creationId xmlns:a16="http://schemas.microsoft.com/office/drawing/2014/main" xmlns="" id="{7583430B-F05F-49A8-8E4D-59900A6DFCD1}"/>
-              </a:ext>
-            </a:extLst>
-          </p:cNvPr>
-          <p:cNvSpPr/>
-          <p:nvPr/>
-        </p:nvSpPr>
-        <p:spPr>
-          <a:xfrm>
-            <a:off x="5297762" y="5657198"/>
-            <a:ext cx="6250770" cy="369332"/>
-          </a:xfrm>
-          <a:prstGeom prst="rect">
-            <a:avLst/>
-          </a:prstGeom>
-        </p:spPr>
-        <p:txBody>
-          <a:bodyPr wrap="square">
-            <a:spAutoFit/>
-          </a:bodyPr>
-          <a:lstStyle/>
-          <a:p>
-            <a:r>
-              <a:rPr lang="pt-PT" dirty="0">
+          </p:spPr>
+        </p:pic>
+        <p:sp>
+          <p:nvSpPr>
+            <p:cNvPr id="8" name="Retângulo 1">
+              <a:extLst>
+                <a:ext uri="{FF2B5EF4-FFF2-40B4-BE49-F238E27FC236}">
+                  <a16:creationId xmlns="" xmlns:a16="http://schemas.microsoft.com/office/drawing/2014/main" id="{7583430B-F05F-49A8-8E4D-59900A6DFCD1}"/>
+                </a:ext>
+              </a:extLst>
+            </p:cNvPr>
+            <p:cNvSpPr/>
+            <p:nvPr/>
+          </p:nvSpPr>
+          <p:spPr>
+            <a:xfrm>
+              <a:off x="5297763" y="5581511"/>
+              <a:ext cx="6250770" cy="369332"/>
+            </a:xfrm>
+            <a:prstGeom prst="rect">
+              <a:avLst/>
+            </a:prstGeom>
+          </p:spPr>
+          <p:txBody>
+            <a:bodyPr wrap="square">
+              <a:spAutoFit/>
+            </a:bodyPr>
+            <a:lstStyle/>
+            <a:p>
+              <a:pPr algn="r"/>
+              <a:r>
+                <a:rPr lang="pt-PT" dirty="0">
+                  <a:solidFill>
+                    <a:schemeClr val="tx2">
+                      <a:lumMod val="20000"/>
+                      <a:lumOff val="80000"/>
+                    </a:schemeClr>
+                  </a:solidFill>
+                  <a:effectLst>
+                    <a:glow rad="63500">
+                      <a:schemeClr val="accent2">
+                        <a:satMod val="175000"/>
+                        <a:alpha val="40000"/>
+                      </a:schemeClr>
+                    </a:glow>
+                  </a:effectLst>
+                  <a:latin typeface="Times New Roman" panose="02020603050405020304" pitchFamily="18" charset="0"/>
+                  <a:cs typeface="Times New Roman" panose="02020603050405020304" pitchFamily="18" charset="0"/>
+                </a:rPr>
+                <a:t>TSP </a:t>
+              </a:r>
+              <a:r>
+                <a:rPr lang="pt-PT" dirty="0" err="1">
+                  <a:solidFill>
+                    <a:schemeClr val="tx2">
+                      <a:lumMod val="20000"/>
+                      <a:lumOff val="80000"/>
+                    </a:schemeClr>
+                  </a:solidFill>
+                  <a:effectLst>
+                    <a:glow rad="63500">
+                      <a:schemeClr val="accent2">
+                        <a:satMod val="175000"/>
+                        <a:alpha val="40000"/>
+                      </a:schemeClr>
+                    </a:glow>
+                  </a:effectLst>
+                  <a:latin typeface="Times New Roman" panose="02020603050405020304" pitchFamily="18" charset="0"/>
+                  <a:cs typeface="Times New Roman" panose="02020603050405020304" pitchFamily="18" charset="0"/>
+                </a:rPr>
+                <a:t>M</a:t>
+              </a:r>
+              <a:r>
+                <a:rPr lang="pt-PT" dirty="0" err="1" smtClean="0">
+                  <a:solidFill>
+                    <a:schemeClr val="tx2">
+                      <a:lumMod val="20000"/>
+                      <a:lumOff val="80000"/>
+                    </a:schemeClr>
+                  </a:solidFill>
+                  <a:effectLst>
+                    <a:glow rad="63500">
+                      <a:schemeClr val="accent2">
+                        <a:satMod val="175000"/>
+                        <a:alpha val="40000"/>
+                      </a:schemeClr>
+                    </a:glow>
+                  </a:effectLst>
+                  <a:latin typeface="Times New Roman" panose="02020603050405020304" pitchFamily="18" charset="0"/>
+                  <a:cs typeface="Times New Roman" panose="02020603050405020304" pitchFamily="18" charset="0"/>
+                </a:rPr>
+                <a:t>ain</a:t>
+              </a:r>
+              <a:r>
+                <a:rPr lang="pt-PT" dirty="0" smtClean="0">
+                  <a:solidFill>
+                    <a:schemeClr val="tx2">
+                      <a:lumMod val="20000"/>
+                      <a:lumOff val="80000"/>
+                    </a:schemeClr>
+                  </a:solidFill>
+                  <a:effectLst>
+                    <a:glow rad="63500">
+                      <a:schemeClr val="accent2">
+                        <a:satMod val="175000"/>
+                        <a:alpha val="40000"/>
+                      </a:schemeClr>
+                    </a:glow>
+                  </a:effectLst>
+                  <a:latin typeface="Times New Roman" panose="02020603050405020304" pitchFamily="18" charset="0"/>
+                  <a:cs typeface="Times New Roman" panose="02020603050405020304" pitchFamily="18" charset="0"/>
+                </a:rPr>
+                <a:t> </a:t>
+              </a:r>
+              <a:r>
+                <a:rPr lang="pt-PT" dirty="0" err="1">
+                  <a:solidFill>
+                    <a:schemeClr val="tx2">
+                      <a:lumMod val="20000"/>
+                      <a:lumOff val="80000"/>
+                    </a:schemeClr>
+                  </a:solidFill>
+                  <a:effectLst>
+                    <a:glow rad="63500">
+                      <a:schemeClr val="accent2">
+                        <a:satMod val="175000"/>
+                        <a:alpha val="40000"/>
+                      </a:schemeClr>
+                    </a:glow>
+                  </a:effectLst>
+                  <a:latin typeface="Times New Roman" panose="02020603050405020304" pitchFamily="18" charset="0"/>
+                  <a:cs typeface="Times New Roman" panose="02020603050405020304" pitchFamily="18" charset="0"/>
+                </a:rPr>
+                <a:t>E</a:t>
+              </a:r>
+              <a:r>
+                <a:rPr lang="pt-PT" dirty="0" err="1" smtClean="0">
+                  <a:solidFill>
+                    <a:schemeClr val="tx2">
+                      <a:lumMod val="20000"/>
+                      <a:lumOff val="80000"/>
+                    </a:schemeClr>
+                  </a:solidFill>
+                  <a:effectLst>
+                    <a:glow rad="63500">
+                      <a:schemeClr val="accent2">
+                        <a:satMod val="175000"/>
+                        <a:alpha val="40000"/>
+                      </a:schemeClr>
+                    </a:glow>
+                  </a:effectLst>
+                  <a:latin typeface="Times New Roman" panose="02020603050405020304" pitchFamily="18" charset="0"/>
+                  <a:cs typeface="Times New Roman" panose="02020603050405020304" pitchFamily="18" charset="0"/>
+                </a:rPr>
+                <a:t>lements</a:t>
+              </a:r>
+              <a:endParaRPr lang="pt-PT" dirty="0">
+                <a:solidFill>
+                  <a:schemeClr val="tx2">
+                    <a:lumMod val="20000"/>
+                    <a:lumOff val="80000"/>
+                  </a:schemeClr>
+                </a:solidFill>
+                <a:effectLst>
+                  <a:glow rad="63500">
+                    <a:schemeClr val="accent2">
+                      <a:satMod val="175000"/>
+                      <a:alpha val="40000"/>
+                    </a:schemeClr>
+                  </a:glow>
+                </a:effectLst>
                 <a:latin typeface="Times New Roman" panose="02020603050405020304" pitchFamily="18" charset="0"/>
                 <a:cs typeface="Times New Roman" panose="02020603050405020304" pitchFamily="18" charset="0"/>
-              </a:rPr>
-              <a:t>TSP </a:t>
-            </a:r>
-            <a:r>
-              <a:rPr lang="pt-PT" dirty="0" err="1">
-                <a:latin typeface="Times New Roman" panose="02020603050405020304" pitchFamily="18" charset="0"/>
-                <a:cs typeface="Times New Roman" panose="02020603050405020304" pitchFamily="18" charset="0"/>
-              </a:rPr>
-              <a:t>M</a:t>
-            </a:r>
-            <a:r>
-              <a:rPr lang="pt-PT" dirty="0" err="1" smtClean="0">
-                <a:latin typeface="Times New Roman" panose="02020603050405020304" pitchFamily="18" charset="0"/>
-                <a:cs typeface="Times New Roman" panose="02020603050405020304" pitchFamily="18" charset="0"/>
-              </a:rPr>
-              <a:t>ain</a:t>
-            </a:r>
-            <a:r>
-              <a:rPr lang="pt-PT" dirty="0" smtClean="0">
-                <a:latin typeface="Times New Roman" panose="02020603050405020304" pitchFamily="18" charset="0"/>
-                <a:cs typeface="Times New Roman" panose="02020603050405020304" pitchFamily="18" charset="0"/>
-              </a:rPr>
-              <a:t> </a:t>
-            </a:r>
-            <a:r>
-              <a:rPr lang="pt-PT" dirty="0" err="1">
-                <a:latin typeface="Times New Roman" panose="02020603050405020304" pitchFamily="18" charset="0"/>
-                <a:cs typeface="Times New Roman" panose="02020603050405020304" pitchFamily="18" charset="0"/>
-              </a:rPr>
-              <a:t>E</a:t>
-            </a:r>
-            <a:r>
-              <a:rPr lang="pt-PT" dirty="0" err="1" smtClean="0">
-                <a:latin typeface="Times New Roman" panose="02020603050405020304" pitchFamily="18" charset="0"/>
-                <a:cs typeface="Times New Roman" panose="02020603050405020304" pitchFamily="18" charset="0"/>
-              </a:rPr>
-              <a:t>lements</a:t>
-            </a:r>
-            <a:endParaRPr lang="pt-PT" dirty="0">
-              <a:latin typeface="Times New Roman" panose="02020603050405020304" pitchFamily="18" charset="0"/>
-              <a:cs typeface="Times New Roman" panose="02020603050405020304" pitchFamily="18" charset="0"/>
-            </a:endParaRPr>
-          </a:p>
-        </p:txBody>
-      </p:sp>
+              </a:endParaRPr>
+            </a:p>
+          </p:txBody>
+        </p:sp>
+      </p:grpSp>
     </p:spTree>
     <p:extLst>
       <p:ext uri="{BB962C8B-B14F-4D97-AF65-F5344CB8AC3E}">
@@ -4552,6 +5241,25 @@
   <p:clrMapOvr>
     <a:masterClrMapping/>
   </p:clrMapOvr>
+  <mc:AlternateContent xmlns:mc="http://schemas.openxmlformats.org/markup-compatibility/2006">
+    <mc:Choice xmlns:p14="http://schemas.microsoft.com/office/powerpoint/2010/main" Requires="p14">
+      <p:transition spd="med" p14:dur="700">
+        <p:fade/>
+      </p:transition>
+    </mc:Choice>
+    <mc:Fallback>
+      <p:transition spd="med">
+        <p:fade/>
+      </p:transition>
+    </mc:Fallback>
+  </mc:AlternateContent>
+  <p:timing>
+    <p:tnLst>
+      <p:par>
+        <p:cTn id="1" dur="indefinite" restart="never" nodeType="tmRoot"/>
+      </p:par>
+    </p:tnLst>
+  </p:timing>
 </p:sld>
 </file>
 
@@ -4587,7 +5295,7 @@
           <p:cNvPr id="3" name="Retângulo 4">
             <a:extLst>
               <a:ext uri="{FF2B5EF4-FFF2-40B4-BE49-F238E27FC236}">
-                <a16:creationId xmlns:a16="http://schemas.microsoft.com/office/drawing/2014/main" xmlns="" id="{DA1D48AE-0441-43D5-99A1-93B32C6D25B9}"/>
+                <a16:creationId xmlns="" xmlns:a16="http://schemas.microsoft.com/office/drawing/2014/main" id="{DA1D48AE-0441-43D5-99A1-93B32C6D25B9}"/>
               </a:ext>
             </a:extLst>
           </p:cNvPr>
@@ -4660,9 +5368,6 @@
               </a:rPr>
               <a:t>:</a:t>
             </a:r>
-            <a:endParaRPr lang="en-US" sz="2800" dirty="0" smtClean="0">
-              <a:cs typeface="Times New Roman" panose="02020603050405020304" pitchFamily="18" charset="0"/>
-            </a:endParaRPr>
           </a:p>
         </p:txBody>
       </p:sp>
@@ -4681,7 +5386,9 @@
             <a:avLst/>
           </a:prstGeom>
           <a:solidFill>
-            <a:srgbClr val="00B0F0"/>
+            <a:srgbClr val="00B0F0">
+              <a:alpha val="50000"/>
+            </a:srgbClr>
           </a:solidFill>
           <a:ln>
             <a:solidFill>
@@ -4743,7 +5450,9 @@
             <a:avLst/>
           </a:prstGeom>
           <a:solidFill>
-            <a:srgbClr val="00B0F0"/>
+            <a:srgbClr val="00B0F0">
+              <a:alpha val="50000"/>
+            </a:srgbClr>
           </a:solidFill>
           <a:ln>
             <a:solidFill>
@@ -4809,7 +5518,9 @@
             <a:avLst/>
           </a:prstGeom>
           <a:solidFill>
-            <a:srgbClr val="00B0F0"/>
+            <a:srgbClr val="00B0F0">
+              <a:alpha val="50000"/>
+            </a:srgbClr>
           </a:solidFill>
           <a:ln>
             <a:solidFill>
@@ -4848,9 +5559,6 @@
               </a:rPr>
               <a:t>Design manager</a:t>
             </a:r>
-            <a:endParaRPr lang="pt-PT" sz="2800" dirty="0">
-              <a:cs typeface="Times New Roman" panose="02020603050405020304" pitchFamily="18" charset="0"/>
-            </a:endParaRPr>
           </a:p>
         </p:txBody>
       </p:sp>
@@ -4869,7 +5577,9 @@
             <a:avLst/>
           </a:prstGeom>
           <a:solidFill>
-            <a:srgbClr val="00B0F0"/>
+            <a:srgbClr val="00B0F0">
+              <a:alpha val="50000"/>
+            </a:srgbClr>
           </a:solidFill>
           <a:ln>
             <a:solidFill>
@@ -4937,7 +5647,9 @@
             <a:avLst/>
           </a:prstGeom>
           <a:solidFill>
-            <a:srgbClr val="00B0F0"/>
+            <a:srgbClr val="00B0F0">
+              <a:alpha val="50000"/>
+            </a:srgbClr>
           </a:solidFill>
           <a:ln>
             <a:solidFill>
@@ -4982,9 +5694,6 @@
               </a:rPr>
               <a:t> manager</a:t>
             </a:r>
-            <a:endParaRPr lang="pt-PT" sz="2800" dirty="0">
-              <a:cs typeface="Times New Roman" panose="02020603050405020304" pitchFamily="18" charset="0"/>
-            </a:endParaRPr>
           </a:p>
         </p:txBody>
       </p:sp>
@@ -5003,7 +5712,9 @@
             <a:avLst/>
           </a:prstGeom>
           <a:solidFill>
-            <a:srgbClr val="00B0F0"/>
+            <a:srgbClr val="00B0F0">
+              <a:alpha val="50000"/>
+            </a:srgbClr>
           </a:solidFill>
           <a:ln>
             <a:solidFill>
@@ -5048,9 +5759,6 @@
               </a:rPr>
               <a:t> manager</a:t>
             </a:r>
-            <a:endParaRPr lang="pt-PT" sz="2800" dirty="0">
-              <a:cs typeface="Times New Roman" panose="02020603050405020304" pitchFamily="18" charset="0"/>
-            </a:endParaRPr>
           </a:p>
         </p:txBody>
       </p:sp>
@@ -5069,7 +5777,9 @@
             <a:avLst/>
           </a:prstGeom>
           <a:solidFill>
-            <a:srgbClr val="00B0F0"/>
+            <a:srgbClr val="00B0F0">
+              <a:alpha val="50000"/>
+            </a:srgbClr>
           </a:solidFill>
           <a:ln>
             <a:solidFill>
@@ -5114,9 +5824,6 @@
               </a:rPr>
               <a:t> manager</a:t>
             </a:r>
-            <a:endParaRPr lang="pt-PT" sz="2800" dirty="0">
-              <a:cs typeface="Times New Roman" panose="02020603050405020304" pitchFamily="18" charset="0"/>
-            </a:endParaRPr>
           </a:p>
         </p:txBody>
       </p:sp>
@@ -5135,7 +5842,9 @@
             <a:avLst/>
           </a:prstGeom>
           <a:solidFill>
-            <a:srgbClr val="00B0F0"/>
+            <a:srgbClr val="00B0F0">
+              <a:alpha val="50000"/>
+            </a:srgbClr>
           </a:solidFill>
           <a:ln>
             <a:solidFill>
@@ -5180,9 +5889,6 @@
               </a:rPr>
               <a:t> manager</a:t>
             </a:r>
-            <a:endParaRPr lang="pt-PT" sz="2800" dirty="0">
-              <a:cs typeface="Times New Roman" panose="02020603050405020304" pitchFamily="18" charset="0"/>
-            </a:endParaRPr>
           </a:p>
         </p:txBody>
       </p:sp>
@@ -5196,6 +5902,25 @@
   <p:clrMapOvr>
     <a:masterClrMapping/>
   </p:clrMapOvr>
+  <mc:AlternateContent xmlns:mc="http://schemas.openxmlformats.org/markup-compatibility/2006">
+    <mc:Choice xmlns:p14="http://schemas.microsoft.com/office/powerpoint/2010/main" Requires="p14">
+      <p:transition spd="med" p14:dur="700">
+        <p:fade/>
+      </p:transition>
+    </mc:Choice>
+    <mc:Fallback>
+      <p:transition spd="med">
+        <p:fade/>
+      </p:transition>
+    </mc:Fallback>
+  </mc:AlternateContent>
+  <p:timing>
+    <p:tnLst>
+      <p:par>
+        <p:cTn id="1" dur="indefinite" restart="never" nodeType="tmRoot"/>
+      </p:par>
+    </p:tnLst>
+  </p:timing>
 </p:sld>
 </file>
 
@@ -5205,9 +5930,7 @@
     <p:bg>
       <p:bgPr>
         <a:solidFill>
-          <a:schemeClr val="tx2">
-            <a:lumMod val="75000"/>
-          </a:schemeClr>
+          <a:schemeClr val="tx1"/>
         </a:solidFill>
         <a:effectLst/>
       </p:bgPr>
@@ -5228,6 +5951,73 @@
       </p:grpSpPr>
       <p:sp>
         <p:nvSpPr>
+          <p:cNvPr id="6" name="Title 1"/>
+          <p:cNvSpPr txBox="1">
+            <a:spLocks/>
+          </p:cNvSpPr>
+          <p:nvPr/>
+        </p:nvSpPr>
+        <p:spPr bwMode="blackWhite">
+          <a:xfrm>
+            <a:off x="4664596" y="1377387"/>
+            <a:ext cx="6852213" cy="4074290"/>
+          </a:xfrm>
+          <a:prstGeom prst="rect">
+            <a:avLst/>
+          </a:prstGeom>
+          <a:noFill/>
+          <a:ln w="31750" cap="sq">
+            <a:solidFill>
+              <a:srgbClr val="00B0F0"/>
+            </a:solidFill>
+            <a:miter lim="800000"/>
+          </a:ln>
+        </p:spPr>
+        <p:txBody>
+          <a:bodyPr vert="horz" wrap="square" lIns="182880" tIns="182880" rIns="182880" bIns="182880" rtlCol="0" anchor="ctr" anchorCtr="1">
+            <a:noAutofit/>
+          </a:bodyPr>
+          <a:lstStyle>
+            <a:lvl1pPr algn="ctr" defTabSz="914400" rtl="0" eaLnBrk="1" latinLnBrk="0" hangingPunct="1">
+              <a:lnSpc>
+                <a:spcPct val="90000"/>
+              </a:lnSpc>
+              <a:spcBef>
+                <a:spcPct val="0"/>
+              </a:spcBef>
+              <a:buNone/>
+              <a:defRPr sz="2200" kern="1200" cap="all" spc="200" baseline="0">
+                <a:solidFill>
+                  <a:srgbClr val="262626"/>
+                </a:solidFill>
+                <a:latin typeface="+mj-lt"/>
+                <a:ea typeface="+mj-ea"/>
+                <a:cs typeface="+mj-cs"/>
+              </a:defRPr>
+            </a:lvl1pPr>
+          </a:lstStyle>
+          <a:p>
+            <a:r>
+              <a:rPr lang="en-US" sz="2000" b="1" cap="none" dirty="0" smtClean="0">
+                <a:solidFill>
+                  <a:schemeClr val="tx1"/>
+                </a:solidFill>
+                <a:latin typeface="Times New Roman" panose="02020603050405020304" pitchFamily="18" charset="0"/>
+                <a:cs typeface="Times New Roman" panose="02020603050405020304" pitchFamily="18" charset="0"/>
+              </a:rPr>
+              <a:t> </a:t>
+            </a:r>
+            <a:endParaRPr lang="en-US" sz="1800" cap="none" dirty="0">
+              <a:solidFill>
+                <a:schemeClr val="tx1"/>
+              </a:solidFill>
+              <a:latin typeface="+mn-lt"/>
+            </a:endParaRPr>
+          </a:p>
+        </p:txBody>
+      </p:sp>
+      <p:sp>
+        <p:nvSpPr>
           <p:cNvPr id="2" name="Title 1"/>
           <p:cNvSpPr>
             <a:spLocks noGrp="1"/>
@@ -5238,8 +6028,8 @@
         </p:nvSpPr>
         <p:spPr>
           <a:xfrm>
-            <a:off x="645161" y="1076982"/>
-            <a:ext cx="3363974" cy="4704037"/>
+            <a:off x="645161" y="1487615"/>
+            <a:ext cx="3363974" cy="3882771"/>
           </a:xfrm>
           <a:noFill/>
           <a:ln>
@@ -5266,7 +6056,34 @@
                 </a:solidFill>
                 <a:latin typeface="+mn-lt"/>
               </a:rPr>
-              <a:t>The TSP consists of 6 major </a:t>
+              <a:t>The TSP </a:t>
+            </a:r>
+            <a:r>
+              <a:rPr lang="en-US" sz="2000" cap="none" dirty="0" smtClean="0">
+                <a:solidFill>
+                  <a:schemeClr val="tx1"/>
+                </a:solidFill>
+                <a:latin typeface="+mn-lt"/>
+              </a:rPr>
+              <a:t>involves</a:t>
+            </a:r>
+            <a:r>
+              <a:rPr lang="en-US" sz="2000" cap="none" dirty="0" smtClean="0">
+                <a:solidFill>
+                  <a:schemeClr val="tx1"/>
+                </a:solidFill>
+                <a:latin typeface="+mn-lt"/>
+              </a:rPr>
+              <a:t> </a:t>
+            </a:r>
+            <a:r>
+              <a:rPr lang="en-US" sz="2000" cap="none" dirty="0" smtClean="0">
+                <a:solidFill>
+                  <a:schemeClr val="tx1"/>
+                </a:solidFill>
+                <a:latin typeface="+mn-lt"/>
+              </a:rPr>
+              <a:t>6 major </a:t>
             </a:r>
             <a:r>
               <a:rPr lang="en-US" sz="2000" b="1" cap="none" dirty="0" smtClean="0">
@@ -5495,7 +6312,7 @@
             <p:cNvPr id="8" name="Imagem 5">
               <a:extLst>
                 <a:ext uri="{FF2B5EF4-FFF2-40B4-BE49-F238E27FC236}">
-                  <a16:creationId xmlns:a16="http://schemas.microsoft.com/office/drawing/2014/main" xmlns="" id="{720A87A9-AEB3-4ADC-961B-0694090B5823}"/>
+                  <a16:creationId xmlns="" xmlns:a16="http://schemas.microsoft.com/office/drawing/2014/main" id="{720A87A9-AEB3-4ADC-961B-0694090B5823}"/>
                 </a:ext>
               </a:extLst>
             </p:cNvPr>
@@ -5524,7 +6341,7 @@
             <p:cNvPr id="10" name="Retângulo 7">
               <a:extLst>
                 <a:ext uri="{FF2B5EF4-FFF2-40B4-BE49-F238E27FC236}">
-                  <a16:creationId xmlns:a16="http://schemas.microsoft.com/office/drawing/2014/main" xmlns="" id="{6D11BDA4-931D-4079-8CB8-02746C4B51EA}"/>
+                  <a16:creationId xmlns="" xmlns:a16="http://schemas.microsoft.com/office/drawing/2014/main" id="{6D11BDA4-931D-4079-8CB8-02746C4B51EA}"/>
                 </a:ext>
               </a:extLst>
             </p:cNvPr>
@@ -5546,8 +6363,23 @@
             </a:bodyPr>
             <a:lstStyle/>
             <a:p>
+              <a:pPr algn="r"/>
               <a:r>
                 <a:rPr lang="pt-PT" dirty="0">
+                  <a:solidFill>
+                    <a:schemeClr val="tx2">
+                      <a:lumMod val="20000"/>
+                      <a:lumOff val="80000"/>
+                    </a:schemeClr>
+                  </a:solidFill>
+                  <a:effectLst>
+                    <a:glow rad="63500">
+                      <a:schemeClr val="accent2">
+                        <a:satMod val="175000"/>
+                        <a:alpha val="40000"/>
+                      </a:schemeClr>
+                    </a:glow>
+                  </a:effectLst>
                   <a:latin typeface="Times New Roman" panose="02020603050405020304" pitchFamily="18" charset="0"/>
                   <a:cs typeface="Times New Roman" panose="02020603050405020304" pitchFamily="18" charset="0"/>
                 </a:rPr>
@@ -5555,6 +6387,20 @@
               </a:r>
               <a:r>
                 <a:rPr lang="pt-PT" dirty="0" err="1">
+                  <a:solidFill>
+                    <a:schemeClr val="tx2">
+                      <a:lumMod val="20000"/>
+                      <a:lumOff val="80000"/>
+                    </a:schemeClr>
+                  </a:solidFill>
+                  <a:effectLst>
+                    <a:glow rad="63500">
+                      <a:schemeClr val="accent2">
+                        <a:satMod val="175000"/>
+                        <a:alpha val="40000"/>
+                      </a:schemeClr>
+                    </a:glow>
+                  </a:effectLst>
                   <a:latin typeface="Times New Roman" panose="02020603050405020304" pitchFamily="18" charset="0"/>
                   <a:cs typeface="Times New Roman" panose="02020603050405020304" pitchFamily="18" charset="0"/>
                 </a:rPr>
@@ -5562,6 +6408,20 @@
               </a:r>
               <a:r>
                 <a:rPr lang="pt-PT" dirty="0">
+                  <a:solidFill>
+                    <a:schemeClr val="tx2">
+                      <a:lumMod val="20000"/>
+                      <a:lumOff val="80000"/>
+                    </a:schemeClr>
+                  </a:solidFill>
+                  <a:effectLst>
+                    <a:glow rad="63500">
+                      <a:schemeClr val="accent2">
+                        <a:satMod val="175000"/>
+                        <a:alpha val="40000"/>
+                      </a:schemeClr>
+                    </a:glow>
+                  </a:effectLst>
                   <a:latin typeface="Times New Roman" panose="02020603050405020304" pitchFamily="18" charset="0"/>
                   <a:cs typeface="Times New Roman" panose="02020603050405020304" pitchFamily="18" charset="0"/>
                 </a:rPr>
@@ -5569,12 +6429,40 @@
               </a:r>
               <a:r>
                 <a:rPr lang="pt-PT" dirty="0" err="1">
+                  <a:solidFill>
+                    <a:schemeClr val="tx2">
+                      <a:lumMod val="20000"/>
+                      <a:lumOff val="80000"/>
+                    </a:schemeClr>
+                  </a:solidFill>
+                  <a:effectLst>
+                    <a:glow rad="63500">
+                      <a:schemeClr val="accent2">
+                        <a:satMod val="175000"/>
+                        <a:alpha val="40000"/>
+                      </a:schemeClr>
+                    </a:glow>
+                  </a:effectLst>
                   <a:latin typeface="Times New Roman" panose="02020603050405020304" pitchFamily="18" charset="0"/>
                   <a:cs typeface="Times New Roman" panose="02020603050405020304" pitchFamily="18" charset="0"/>
                 </a:rPr>
                 <a:t>Flow</a:t>
               </a:r>
               <a:endParaRPr lang="pt-PT" dirty="0">
+                <a:solidFill>
+                  <a:schemeClr val="tx2">
+                    <a:lumMod val="20000"/>
+                    <a:lumOff val="80000"/>
+                  </a:schemeClr>
+                </a:solidFill>
+                <a:effectLst>
+                  <a:glow rad="63500">
+                    <a:schemeClr val="accent2">
+                      <a:satMod val="175000"/>
+                      <a:alpha val="40000"/>
+                    </a:schemeClr>
+                  </a:glow>
+                </a:effectLst>
                 <a:latin typeface="Times New Roman" panose="02020603050405020304" pitchFamily="18" charset="0"/>
                 <a:cs typeface="Times New Roman" panose="02020603050405020304" pitchFamily="18" charset="0"/>
               </a:endParaRPr>
@@ -5592,6 +6480,25 @@
   <p:clrMapOvr>
     <a:masterClrMapping/>
   </p:clrMapOvr>
+  <mc:AlternateContent xmlns:mc="http://schemas.openxmlformats.org/markup-compatibility/2006">
+    <mc:Choice xmlns:p14="http://schemas.microsoft.com/office/powerpoint/2010/main" Requires="p14">
+      <p:transition spd="med" p14:dur="700">
+        <p:fade/>
+      </p:transition>
+    </mc:Choice>
+    <mc:Fallback>
+      <p:transition spd="med">
+        <p:fade/>
+      </p:transition>
+    </mc:Fallback>
+  </mc:AlternateContent>
+  <p:timing>
+    <p:tnLst>
+      <p:par>
+        <p:cTn id="1" dur="indefinite" restart="never" nodeType="tmRoot"/>
+      </p:par>
+    </p:tnLst>
+  </p:timing>
 </p:sld>
 </file>
 
@@ -5601,9 +6508,7 @@
     <p:bg>
       <p:bgPr>
         <a:solidFill>
-          <a:schemeClr val="tx2">
-            <a:lumMod val="75000"/>
-          </a:schemeClr>
+          <a:schemeClr val="tx1"/>
         </a:solidFill>
         <a:effectLst/>
       </p:bgPr>
@@ -5624,6 +6529,73 @@
       </p:grpSpPr>
       <p:sp>
         <p:nvSpPr>
+          <p:cNvPr id="7" name="Title 1"/>
+          <p:cNvSpPr txBox="1">
+            <a:spLocks/>
+          </p:cNvSpPr>
+          <p:nvPr/>
+        </p:nvSpPr>
+        <p:spPr bwMode="blackWhite">
+          <a:xfrm>
+            <a:off x="6690167" y="1296365"/>
+            <a:ext cx="5101014" cy="3889094"/>
+          </a:xfrm>
+          <a:prstGeom prst="rect">
+            <a:avLst/>
+          </a:prstGeom>
+          <a:noFill/>
+          <a:ln w="31750" cap="sq">
+            <a:solidFill>
+              <a:srgbClr val="00B0F0"/>
+            </a:solidFill>
+            <a:miter lim="800000"/>
+          </a:ln>
+        </p:spPr>
+        <p:txBody>
+          <a:bodyPr vert="horz" wrap="square" lIns="182880" tIns="182880" rIns="182880" bIns="182880" rtlCol="0" anchor="ctr" anchorCtr="1">
+            <a:noAutofit/>
+          </a:bodyPr>
+          <a:lstStyle>
+            <a:lvl1pPr algn="ctr" defTabSz="914400" rtl="0" eaLnBrk="1" latinLnBrk="0" hangingPunct="1">
+              <a:lnSpc>
+                <a:spcPct val="90000"/>
+              </a:lnSpc>
+              <a:spcBef>
+                <a:spcPct val="0"/>
+              </a:spcBef>
+              <a:buNone/>
+              <a:defRPr sz="2200" kern="1200" cap="all" spc="200" baseline="0">
+                <a:solidFill>
+                  <a:srgbClr val="262626"/>
+                </a:solidFill>
+                <a:latin typeface="+mj-lt"/>
+                <a:ea typeface="+mj-ea"/>
+                <a:cs typeface="+mj-cs"/>
+              </a:defRPr>
+            </a:lvl1pPr>
+          </a:lstStyle>
+          <a:p>
+            <a:r>
+              <a:rPr lang="en-US" sz="2000" b="1" cap="none" dirty="0" smtClean="0">
+                <a:solidFill>
+                  <a:schemeClr val="tx1"/>
+                </a:solidFill>
+                <a:latin typeface="Times New Roman" panose="02020603050405020304" pitchFamily="18" charset="0"/>
+                <a:cs typeface="Times New Roman" panose="02020603050405020304" pitchFamily="18" charset="0"/>
+              </a:rPr>
+              <a:t> </a:t>
+            </a:r>
+            <a:endParaRPr lang="en-US" sz="1800" cap="none" dirty="0">
+              <a:solidFill>
+                <a:schemeClr val="tx1"/>
+              </a:solidFill>
+              <a:latin typeface="+mn-lt"/>
+            </a:endParaRPr>
+          </a:p>
+        </p:txBody>
+      </p:sp>
+      <p:sp>
+        <p:nvSpPr>
           <p:cNvPr id="2" name="Title 1"/>
           <p:cNvSpPr>
             <a:spLocks noGrp="1"/>
@@ -5663,7 +6635,21 @@
                 <a:latin typeface="+mn-lt"/>
                 <a:cs typeface="Times New Roman" panose="02020603050405020304" pitchFamily="18" charset="0"/>
               </a:rPr>
-              <a:t>The quality of a project is an essential part of it. The TSP shows teams how to manage quality, by:</a:t>
+              <a:t>The quality of a project is an essential </a:t>
+            </a:r>
+            <a:r>
+              <a:rPr lang="en-GB" sz="2000" cap="none" dirty="0" smtClean="0">
+                <a:latin typeface="+mn-lt"/>
+                <a:cs typeface="Times New Roman" panose="02020603050405020304" pitchFamily="18" charset="0"/>
+              </a:rPr>
+              <a:t>part. </a:t>
+            </a:r>
+            <a:r>
+              <a:rPr lang="en-GB" sz="2000" cap="none" dirty="0" smtClean="0">
+                <a:latin typeface="+mn-lt"/>
+                <a:cs typeface="Times New Roman" panose="02020603050405020304" pitchFamily="18" charset="0"/>
+              </a:rPr>
+              <a:t>The TSP shows teams how to manage quality, by:</a:t>
             </a:r>
             <a:br>
               <a:rPr lang="en-GB" sz="2000" cap="none" dirty="0" smtClean="0">
@@ -5751,7 +6737,7 @@
             <p:cNvPr id="5" name="Imagem 6">
               <a:extLst>
                 <a:ext uri="{FF2B5EF4-FFF2-40B4-BE49-F238E27FC236}">
-                  <a16:creationId xmlns:a16="http://schemas.microsoft.com/office/drawing/2014/main" xmlns="" id="{8A6A3E3D-66C5-4965-B0BD-FCE001DDD342}"/>
+                  <a16:creationId xmlns="" xmlns:a16="http://schemas.microsoft.com/office/drawing/2014/main" id="{8A6A3E3D-66C5-4965-B0BD-FCE001DDD342}"/>
                 </a:ext>
               </a:extLst>
             </p:cNvPr>
@@ -5780,7 +6766,7 @@
             <p:cNvPr id="6" name="Retângulo 8">
               <a:extLst>
                 <a:ext uri="{FF2B5EF4-FFF2-40B4-BE49-F238E27FC236}">
-                  <a16:creationId xmlns:a16="http://schemas.microsoft.com/office/drawing/2014/main" xmlns="" id="{DF896C1B-5591-4490-91B3-5EAB94EA146D}"/>
+                  <a16:creationId xmlns="" xmlns:a16="http://schemas.microsoft.com/office/drawing/2014/main" id="{DF896C1B-5591-4490-91B3-5EAB94EA146D}"/>
                 </a:ext>
               </a:extLst>
             </p:cNvPr>
@@ -5802,14 +6788,43 @@
             </a:bodyPr>
             <a:lstStyle/>
             <a:p>
+              <a:pPr algn="r"/>
               <a:r>
                 <a:rPr lang="en-US" dirty="0">
+                  <a:solidFill>
+                    <a:schemeClr val="tx2">
+                      <a:lumMod val="20000"/>
+                      <a:lumOff val="80000"/>
+                    </a:schemeClr>
+                  </a:solidFill>
+                  <a:effectLst>
+                    <a:glow rad="63500">
+                      <a:schemeClr val="accent2">
+                        <a:satMod val="175000"/>
+                        <a:alpha val="40000"/>
+                      </a:schemeClr>
+                    </a:glow>
+                  </a:effectLst>
                   <a:latin typeface="Times New Roman" panose="02020603050405020304" pitchFamily="18" charset="0"/>
                   <a:cs typeface="Times New Roman" panose="02020603050405020304" pitchFamily="18" charset="0"/>
                 </a:rPr>
                 <a:t>PDF plot</a:t>
               </a:r>
               <a:endParaRPr lang="pt-PT" dirty="0">
+                <a:solidFill>
+                  <a:schemeClr val="tx2">
+                    <a:lumMod val="20000"/>
+                    <a:lumOff val="80000"/>
+                  </a:schemeClr>
+                </a:solidFill>
+                <a:effectLst>
+                  <a:glow rad="63500">
+                    <a:schemeClr val="accent2">
+                      <a:satMod val="175000"/>
+                      <a:alpha val="40000"/>
+                    </a:schemeClr>
+                  </a:glow>
+                </a:effectLst>
                 <a:latin typeface="Times New Roman" panose="02020603050405020304" pitchFamily="18" charset="0"/>
                 <a:cs typeface="Times New Roman" panose="02020603050405020304" pitchFamily="18" charset="0"/>
               </a:endParaRPr>
@@ -5827,6 +6842,25 @@
   <p:clrMapOvr>
     <a:masterClrMapping/>
   </p:clrMapOvr>
+  <mc:AlternateContent xmlns:mc="http://schemas.openxmlformats.org/markup-compatibility/2006">
+    <mc:Choice xmlns:p14="http://schemas.microsoft.com/office/powerpoint/2010/main" Requires="p14">
+      <p:transition spd="med" p14:dur="700">
+        <p:fade/>
+      </p:transition>
+    </mc:Choice>
+    <mc:Fallback>
+      <p:transition spd="med">
+        <p:fade/>
+      </p:transition>
+    </mc:Fallback>
+  </mc:AlternateContent>
+  <p:timing>
+    <p:tnLst>
+      <p:par>
+        <p:cTn id="1" dur="indefinite" restart="never" nodeType="tmRoot"/>
+      </p:par>
+    </p:tnLst>
+  </p:timing>
 </p:sld>
 </file>
 
@@ -5836,9 +6870,7 @@
     <p:bg>
       <p:bgPr>
         <a:solidFill>
-          <a:schemeClr val="tx2">
-            <a:lumMod val="75000"/>
-          </a:schemeClr>
+          <a:schemeClr val="tx1"/>
         </a:solidFill>
         <a:effectLst/>
       </p:bgPr>
@@ -5859,6 +6891,73 @@
       </p:grpSpPr>
       <p:sp>
         <p:nvSpPr>
+          <p:cNvPr id="5" name="Title 1"/>
+          <p:cNvSpPr txBox="1">
+            <a:spLocks/>
+          </p:cNvSpPr>
+          <p:nvPr/>
+        </p:nvSpPr>
+        <p:spPr bwMode="blackWhite">
+          <a:xfrm>
+            <a:off x="5382228" y="1296365"/>
+            <a:ext cx="6053559" cy="4247908"/>
+          </a:xfrm>
+          <a:prstGeom prst="rect">
+            <a:avLst/>
+          </a:prstGeom>
+          <a:noFill/>
+          <a:ln w="31750" cap="sq">
+            <a:solidFill>
+              <a:srgbClr val="00B0F0"/>
+            </a:solidFill>
+            <a:miter lim="800000"/>
+          </a:ln>
+        </p:spPr>
+        <p:txBody>
+          <a:bodyPr vert="horz" wrap="square" lIns="182880" tIns="182880" rIns="182880" bIns="182880" rtlCol="0" anchor="ctr" anchorCtr="1">
+            <a:noAutofit/>
+          </a:bodyPr>
+          <a:lstStyle>
+            <a:lvl1pPr algn="ctr" defTabSz="914400" rtl="0" eaLnBrk="1" latinLnBrk="0" hangingPunct="1">
+              <a:lnSpc>
+                <a:spcPct val="90000"/>
+              </a:lnSpc>
+              <a:spcBef>
+                <a:spcPct val="0"/>
+              </a:spcBef>
+              <a:buNone/>
+              <a:defRPr sz="2200" kern="1200" cap="all" spc="200" baseline="0">
+                <a:solidFill>
+                  <a:srgbClr val="262626"/>
+                </a:solidFill>
+                <a:latin typeface="+mj-lt"/>
+                <a:ea typeface="+mj-ea"/>
+                <a:cs typeface="+mj-cs"/>
+              </a:defRPr>
+            </a:lvl1pPr>
+          </a:lstStyle>
+          <a:p>
+            <a:r>
+              <a:rPr lang="en-US" sz="2000" b="1" cap="none" dirty="0" smtClean="0">
+                <a:solidFill>
+                  <a:schemeClr val="tx1"/>
+                </a:solidFill>
+                <a:latin typeface="Times New Roman" panose="02020603050405020304" pitchFamily="18" charset="0"/>
+                <a:cs typeface="Times New Roman" panose="02020603050405020304" pitchFamily="18" charset="0"/>
+              </a:rPr>
+              <a:t> </a:t>
+            </a:r>
+            <a:endParaRPr lang="en-US" sz="1800" cap="none" dirty="0">
+              <a:solidFill>
+                <a:schemeClr val="tx1"/>
+              </a:solidFill>
+              <a:latin typeface="+mn-lt"/>
+            </a:endParaRPr>
+          </a:p>
+        </p:txBody>
+      </p:sp>
+      <p:sp>
+        <p:nvSpPr>
           <p:cNvPr id="2" name="Title 1"/>
           <p:cNvSpPr>
             <a:spLocks noGrp="1"/>
@@ -6016,7 +7115,7 @@
           <p:cNvPr id="7" name="Imagem 4">
             <a:extLst>
               <a:ext uri="{FF2B5EF4-FFF2-40B4-BE49-F238E27FC236}">
-                <a16:creationId xmlns:a16="http://schemas.microsoft.com/office/drawing/2014/main" xmlns="" id="{6C3B0C3F-962E-4CBD-BE37-01E6DE2DACF3}"/>
+                <a16:creationId xmlns="" xmlns:a16="http://schemas.microsoft.com/office/drawing/2014/main" id="{6C3B0C3F-962E-4CBD-BE37-01E6DE2DACF3}"/>
               </a:ext>
             </a:extLst>
           </p:cNvPr>
@@ -6058,7 +7157,7 @@
           <p:cNvPr id="8" name="Retângulo 5">
             <a:extLst>
               <a:ext uri="{FF2B5EF4-FFF2-40B4-BE49-F238E27FC236}">
-                <a16:creationId xmlns:a16="http://schemas.microsoft.com/office/drawing/2014/main" xmlns="" id="{6198E3B8-AFB8-4310-B801-526FEF172B7C}"/>
+                <a16:creationId xmlns="" xmlns:a16="http://schemas.microsoft.com/office/drawing/2014/main" id="{6198E3B8-AFB8-4310-B801-526FEF172B7C}"/>
               </a:ext>
             </a:extLst>
           </p:cNvPr>
@@ -6080,8 +7179,23 @@
           </a:bodyPr>
           <a:lstStyle/>
           <a:p>
+            <a:pPr algn="r"/>
             <a:r>
               <a:rPr lang="pt-PT" dirty="0">
+                <a:solidFill>
+                  <a:schemeClr val="tx2">
+                    <a:lumMod val="20000"/>
+                    <a:lumOff val="80000"/>
+                  </a:schemeClr>
+                </a:solidFill>
+                <a:effectLst>
+                  <a:glow rad="63500">
+                    <a:schemeClr val="accent2">
+                      <a:satMod val="175000"/>
+                      <a:alpha val="40000"/>
+                    </a:schemeClr>
+                  </a:glow>
+                </a:effectLst>
                 <a:latin typeface="Times New Roman" panose="02020603050405020304" pitchFamily="18" charset="0"/>
                 <a:cs typeface="Times New Roman" panose="02020603050405020304" pitchFamily="18" charset="0"/>
               </a:rPr>
@@ -6089,6 +7203,20 @@
             </a:r>
             <a:r>
               <a:rPr lang="pt-PT" dirty="0" err="1">
+                <a:solidFill>
+                  <a:schemeClr val="tx2">
+                    <a:lumMod val="20000"/>
+                    <a:lumOff val="80000"/>
+                  </a:schemeClr>
+                </a:solidFill>
+                <a:effectLst>
+                  <a:glow rad="63500">
+                    <a:schemeClr val="accent2">
+                      <a:satMod val="175000"/>
+                      <a:alpha val="40000"/>
+                    </a:schemeClr>
+                  </a:glow>
+                </a:effectLst>
                 <a:latin typeface="Times New Roman" panose="02020603050405020304" pitchFamily="18" charset="0"/>
                 <a:cs typeface="Times New Roman" panose="02020603050405020304" pitchFamily="18" charset="0"/>
               </a:rPr>
@@ -6096,6 +7224,20 @@
             </a:r>
             <a:r>
               <a:rPr lang="pt-PT" dirty="0">
+                <a:solidFill>
+                  <a:schemeClr val="tx2">
+                    <a:lumMod val="20000"/>
+                    <a:lumOff val="80000"/>
+                  </a:schemeClr>
+                </a:solidFill>
+                <a:effectLst>
+                  <a:glow rad="63500">
+                    <a:schemeClr val="accent2">
+                      <a:satMod val="175000"/>
+                      <a:alpha val="40000"/>
+                    </a:schemeClr>
+                  </a:glow>
+                </a:effectLst>
                 <a:latin typeface="Times New Roman" panose="02020603050405020304" pitchFamily="18" charset="0"/>
                 <a:cs typeface="Times New Roman" panose="02020603050405020304" pitchFamily="18" charset="0"/>
               </a:rPr>
@@ -6103,12 +7245,40 @@
             </a:r>
             <a:r>
               <a:rPr lang="pt-PT" dirty="0" err="1">
+                <a:solidFill>
+                  <a:schemeClr val="tx2">
+                    <a:lumMod val="20000"/>
+                    <a:lumOff val="80000"/>
+                  </a:schemeClr>
+                </a:solidFill>
+                <a:effectLst>
+                  <a:glow rad="63500">
+                    <a:schemeClr val="accent2">
+                      <a:satMod val="175000"/>
+                      <a:alpha val="40000"/>
+                    </a:schemeClr>
+                  </a:glow>
+                </a:effectLst>
                 <a:latin typeface="Times New Roman" panose="02020603050405020304" pitchFamily="18" charset="0"/>
                 <a:cs typeface="Times New Roman" panose="02020603050405020304" pitchFamily="18" charset="0"/>
               </a:rPr>
               <a:t>Defects</a:t>
             </a:r>
             <a:endParaRPr lang="pt-PT" dirty="0">
+              <a:solidFill>
+                <a:schemeClr val="tx2">
+                  <a:lumMod val="20000"/>
+                  <a:lumOff val="80000"/>
+                </a:schemeClr>
+              </a:solidFill>
+              <a:effectLst>
+                <a:glow rad="63500">
+                  <a:schemeClr val="accent2">
+                    <a:satMod val="175000"/>
+                    <a:alpha val="40000"/>
+                  </a:schemeClr>
+                </a:glow>
+              </a:effectLst>
               <a:latin typeface="Times New Roman" panose="02020603050405020304" pitchFamily="18" charset="0"/>
               <a:cs typeface="Times New Roman" panose="02020603050405020304" pitchFamily="18" charset="0"/>
             </a:endParaRPr>
@@ -6125,6 +7295,25 @@
   <p:clrMapOvr>
     <a:masterClrMapping/>
   </p:clrMapOvr>
+  <mc:AlternateContent xmlns:mc="http://schemas.openxmlformats.org/markup-compatibility/2006">
+    <mc:Choice xmlns:p14="http://schemas.microsoft.com/office/powerpoint/2010/main" Requires="p14">
+      <p:transition spd="med" p14:dur="700">
+        <p:fade/>
+      </p:transition>
+    </mc:Choice>
+    <mc:Fallback>
+      <p:transition spd="med">
+        <p:fade/>
+      </p:transition>
+    </mc:Fallback>
+  </mc:AlternateContent>
+  <p:timing>
+    <p:tnLst>
+      <p:par>
+        <p:cTn id="1" dur="indefinite" restart="never" nodeType="tmRoot"/>
+      </p:par>
+    </p:tnLst>
+  </p:timing>
 </p:sld>
 </file>
 
@@ -6160,7 +7349,7 @@
           <p:cNvPr id="6" name="Retângulo 3">
             <a:extLst>
               <a:ext uri="{FF2B5EF4-FFF2-40B4-BE49-F238E27FC236}">
-                <a16:creationId xmlns:a16="http://schemas.microsoft.com/office/drawing/2014/main" xmlns="" id="{5EA34D3A-2F40-45D5-89C6-14AAE8F843A8}"/>
+                <a16:creationId xmlns="" xmlns:a16="http://schemas.microsoft.com/office/drawing/2014/main" id="{5EA34D3A-2F40-45D5-89C6-14AAE8F843A8}"/>
               </a:ext>
             </a:extLst>
           </p:cNvPr>
@@ -6170,7 +7359,7 @@
         <p:spPr>
           <a:xfrm>
             <a:off x="408804" y="1552437"/>
-            <a:ext cx="5955195" cy="1015663"/>
+            <a:ext cx="5955195" cy="961417"/>
           </a:xfrm>
           <a:prstGeom prst="rect">
             <a:avLst/>
@@ -6189,9 +7378,21 @@
             </a:pPr>
             <a:r>
               <a:rPr lang="en-US" sz="2000" dirty="0">
-                <a:cs typeface="Times New Roman" panose="02020603050405020304" pitchFamily="18" charset="0"/>
-              </a:rPr>
-              <a:t>TSP has many proven </a:t>
+                <a:solidFill>
+                  <a:schemeClr val="tx2">
+                    <a:lumMod val="20000"/>
+                    <a:lumOff val="80000"/>
+                  </a:schemeClr>
+                </a:solidFill>
+                <a:cs typeface="Times New Roman" panose="02020603050405020304" pitchFamily="18" charset="0"/>
+              </a:rPr>
+              <a:t>TSP has many proven</a:t>
+            </a:r>
+            <a:r>
+              <a:rPr lang="en-US" sz="2000" dirty="0">
+                <a:cs typeface="Times New Roman" panose="02020603050405020304" pitchFamily="18" charset="0"/>
+              </a:rPr>
+              <a:t> </a:t>
             </a:r>
             <a:r>
               <a:rPr lang="en-US" sz="2000" b="1" dirty="0" smtClean="0">
@@ -6204,6 +7405,12 @@
             </a:r>
             <a:r>
               <a:rPr lang="en-US" sz="2000" dirty="0" smtClean="0">
+                <a:solidFill>
+                  <a:schemeClr val="tx2">
+                    <a:lumMod val="20000"/>
+                    <a:lumOff val="80000"/>
+                  </a:schemeClr>
+                </a:solidFill>
                 <a:cs typeface="Times New Roman" panose="02020603050405020304" pitchFamily="18" charset="0"/>
               </a:rPr>
               <a:t>…</a:t>
@@ -6228,7 +7435,7 @@
           <p:cNvPr id="7" name="Retângulo 4">
             <a:extLst>
               <a:ext uri="{FF2B5EF4-FFF2-40B4-BE49-F238E27FC236}">
-                <a16:creationId xmlns:a16="http://schemas.microsoft.com/office/drawing/2014/main" xmlns="" id="{78CA1605-43C3-40D1-A74D-927D1B33FDEF}"/>
+                <a16:creationId xmlns="" xmlns:a16="http://schemas.microsoft.com/office/drawing/2014/main" id="{78CA1605-43C3-40D1-A74D-927D1B33FDEF}"/>
               </a:ext>
             </a:extLst>
           </p:cNvPr>
@@ -6257,6 +7464,12 @@
             </a:pPr>
             <a:r>
               <a:rPr lang="en-US" sz="2000" dirty="0">
+                <a:solidFill>
+                  <a:schemeClr val="tx2">
+                    <a:lumMod val="20000"/>
+                    <a:lumOff val="80000"/>
+                  </a:schemeClr>
+                </a:solidFill>
                 <a:cs typeface="Times New Roman" panose="02020603050405020304" pitchFamily="18" charset="0"/>
               </a:rPr>
               <a:t>…but also some </a:t>
@@ -6272,6 +7485,12 @@
             </a:r>
             <a:r>
               <a:rPr lang="en-US" sz="2000" dirty="0">
+                <a:solidFill>
+                  <a:schemeClr val="tx2">
+                    <a:lumMod val="20000"/>
+                    <a:lumOff val="80000"/>
+                  </a:schemeClr>
+                </a:solidFill>
                 <a:cs typeface="Times New Roman" panose="02020603050405020304" pitchFamily="18" charset="0"/>
               </a:rPr>
               <a:t>:</a:t>
@@ -6294,7 +7513,7 @@
           <p:cNvPr id="8" name="Conexão reta 7">
             <a:extLst>
               <a:ext uri="{FF2B5EF4-FFF2-40B4-BE49-F238E27FC236}">
-                <a16:creationId xmlns:a16="http://schemas.microsoft.com/office/drawing/2014/main" xmlns="" id="{0FAEB1C7-25F2-4E7D-AEBD-D60616321D77}"/>
+                <a16:creationId xmlns="" xmlns:a16="http://schemas.microsoft.com/office/drawing/2014/main" id="{0FAEB1C7-25F2-4E7D-AEBD-D60616321D77}"/>
               </a:ext>
             </a:extLst>
           </p:cNvPr>
@@ -6303,15 +7522,18 @@
         </p:nvCxnSpPr>
         <p:spPr>
           <a:xfrm>
-            <a:off x="6096000" y="1250609"/>
-            <a:ext cx="0" cy="4356783"/>
+            <a:off x="6076709" y="347241"/>
+            <a:ext cx="34724" cy="5937067"/>
           </a:xfrm>
           <a:prstGeom prst="line">
             <a:avLst/>
           </a:prstGeom>
           <a:ln>
             <a:solidFill>
-              <a:schemeClr val="tx1"/>
+              <a:schemeClr val="tx2">
+                <a:lumMod val="20000"/>
+                <a:lumOff val="80000"/>
+              </a:schemeClr>
             </a:solidFill>
           </a:ln>
         </p:spPr>
@@ -6345,7 +7567,9 @@
             <a:avLst/>
           </a:prstGeom>
           <a:solidFill>
-            <a:srgbClr val="00B0F0"/>
+            <a:srgbClr val="00B0F0">
+              <a:alpha val="50000"/>
+            </a:srgbClr>
           </a:solidFill>
           <a:ln>
             <a:solidFill>
@@ -6373,12 +7597,12 @@
           <a:bodyPr rtlCol="0" anchor="ctr"/>
           <a:lstStyle/>
           <a:p>
-            <a:pPr marL="342900" indent="226800" algn="just">
+            <a:pPr marL="685800" indent="-342900" algn="just">
               <a:lnSpc>
                 <a:spcPct val="150000"/>
               </a:lnSpc>
-              <a:buFont typeface="Courier New" charset="0"/>
-              <a:buChar char="o"/>
+              <a:buFont typeface="Wingdings" charset="2"/>
+              <a:buChar char="§"/>
             </a:pPr>
             <a:r>
               <a:rPr lang="en-US" sz="2000" dirty="0">
@@ -6388,12 +7612,12 @@
             </a:r>
           </a:p>
           <a:p>
-            <a:pPr marL="342900" indent="226800" algn="just">
+            <a:pPr marL="685800" indent="-342900" algn="just">
               <a:lnSpc>
                 <a:spcPct val="150000"/>
               </a:lnSpc>
-              <a:buFont typeface="Courier New" charset="0"/>
-              <a:buChar char="o"/>
+              <a:buFont typeface="Wingdings" charset="2"/>
+              <a:buChar char="§"/>
             </a:pPr>
             <a:r>
               <a:rPr lang="en-US" sz="2000" dirty="0">
@@ -6403,12 +7627,12 @@
             </a:r>
           </a:p>
           <a:p>
-            <a:pPr marL="342900" indent="226800" algn="just">
+            <a:pPr marL="685800" indent="-342900" algn="just">
               <a:lnSpc>
                 <a:spcPct val="150000"/>
               </a:lnSpc>
-              <a:buFont typeface="Courier New" charset="0"/>
-              <a:buChar char="o"/>
+              <a:buFont typeface="Wingdings" charset="2"/>
+              <a:buChar char="§"/>
             </a:pPr>
             <a:r>
               <a:rPr lang="en-US" sz="2000" dirty="0">
@@ -6418,12 +7642,12 @@
             </a:r>
           </a:p>
           <a:p>
-            <a:pPr marL="342900" indent="226800" algn="just">
+            <a:pPr marL="685800" indent="-342900" algn="just">
               <a:lnSpc>
                 <a:spcPct val="150000"/>
               </a:lnSpc>
-              <a:buFont typeface="Courier New" charset="0"/>
-              <a:buChar char="o"/>
+              <a:buFont typeface="Wingdings" charset="2"/>
+              <a:buChar char="§"/>
             </a:pPr>
             <a:r>
               <a:rPr lang="en-US" sz="2000" dirty="0">
@@ -6431,9 +7655,6 @@
               </a:rPr>
               <a:t>High quality products.</a:t>
             </a:r>
-            <a:endParaRPr lang="en-US" sz="2000" dirty="0">
-              <a:cs typeface="Times New Roman" panose="02020603050405020304" pitchFamily="18" charset="0"/>
-            </a:endParaRPr>
           </a:p>
         </p:txBody>
       </p:sp>
@@ -6446,13 +7667,15 @@
         <p:spPr>
           <a:xfrm>
             <a:off x="6832406" y="2252944"/>
-            <a:ext cx="4705992" cy="4031364"/>
+            <a:ext cx="4705992" cy="3187157"/>
           </a:xfrm>
           <a:prstGeom prst="rect">
             <a:avLst/>
           </a:prstGeom>
           <a:solidFill>
-            <a:srgbClr val="00B0F0"/>
+            <a:srgbClr val="00B0F0">
+              <a:alpha val="50000"/>
+            </a:srgbClr>
           </a:solidFill>
           <a:ln>
             <a:solidFill>
@@ -6480,18 +7703,36 @@
           <a:bodyPr rtlCol="0" anchor="ctr"/>
           <a:lstStyle/>
           <a:p>
-            <a:pPr marL="342900" indent="226800" algn="just">
+            <a:pPr marL="685800" indent="-342900" algn="just">
               <a:lnSpc>
                 <a:spcPct val="150000"/>
               </a:lnSpc>
-              <a:buFont typeface="Courier New" charset="0"/>
-              <a:buChar char="o"/>
+              <a:buFont typeface="Wingdings" charset="2"/>
+              <a:buChar char="§"/>
             </a:pPr>
             <a:r>
+              <a:rPr lang="en-US" sz="2000" dirty="0" smtClean="0">
+                <a:cs typeface="Times New Roman" panose="02020603050405020304" pitchFamily="18" charset="0"/>
+              </a:rPr>
+              <a:t>A lot </a:t>
+            </a:r>
+            <a:r>
               <a:rPr lang="en-US" sz="2000" dirty="0">
                 <a:cs typeface="Times New Roman" panose="02020603050405020304" pitchFamily="18" charset="0"/>
               </a:rPr>
-              <a:t>Need to do a lot of plans that have to be </a:t>
+              <a:t>of </a:t>
+            </a:r>
+            <a:r>
+              <a:rPr lang="en-US" sz="2000" dirty="0" smtClean="0">
+                <a:cs typeface="Times New Roman" panose="02020603050405020304" pitchFamily="18" charset="0"/>
+              </a:rPr>
+              <a:t>planning is needed and has to </a:t>
+            </a:r>
+            <a:r>
+              <a:rPr lang="en-US" sz="2000" dirty="0">
+                <a:cs typeface="Times New Roman" panose="02020603050405020304" pitchFamily="18" charset="0"/>
+              </a:rPr>
+              <a:t>be </a:t>
             </a:r>
             <a:r>
               <a:rPr lang="en-US" sz="2000" b="1" dirty="0">
@@ -6507,52 +7748,64 @@
             </a:r>
           </a:p>
           <a:p>
-            <a:pPr marL="342900" indent="226800" algn="just">
+            <a:pPr marL="685800" indent="-342900" algn="just">
               <a:lnSpc>
                 <a:spcPct val="150000"/>
               </a:lnSpc>
-              <a:buFont typeface="Courier New" charset="0"/>
-              <a:buChar char="o"/>
+              <a:buFont typeface="Wingdings" charset="2"/>
+              <a:buChar char="§"/>
             </a:pPr>
             <a:r>
+              <a:rPr lang="en-US" sz="2000" dirty="0" smtClean="0">
+                <a:cs typeface="Times New Roman" panose="02020603050405020304" pitchFamily="18" charset="0"/>
+              </a:rPr>
+              <a:t>Is very time consuming as there are </a:t>
+            </a:r>
+            <a:r>
               <a:rPr lang="en-US" sz="2000" dirty="0">
                 <a:cs typeface="Times New Roman" panose="02020603050405020304" pitchFamily="18" charset="0"/>
               </a:rPr>
-              <a:t>Wastes a lot of time in weekly meetings;</a:t>
-            </a:r>
-          </a:p>
-          <a:p>
-            <a:pPr marL="342900" indent="226800" algn="just">
+              <a:t>weekly meetings;</a:t>
+            </a:r>
+          </a:p>
+          <a:p>
+            <a:pPr marL="685800" indent="-342900" algn="just">
               <a:lnSpc>
                 <a:spcPct val="150000"/>
               </a:lnSpc>
-              <a:buFont typeface="Courier New" charset="0"/>
-              <a:buChar char="o"/>
+              <a:buFont typeface="Wingdings" charset="2"/>
+              <a:buChar char="§"/>
             </a:pPr>
             <a:r>
+              <a:rPr lang="en-US" sz="2000" dirty="0" smtClean="0">
+                <a:cs typeface="Times New Roman" panose="02020603050405020304" pitchFamily="18" charset="0"/>
+              </a:rPr>
+              <a:t>There is c</a:t>
+            </a:r>
+            <a:r>
+              <a:rPr lang="en-US" sz="2000" dirty="0" smtClean="0">
+                <a:cs typeface="Times New Roman" panose="02020603050405020304" pitchFamily="18" charset="0"/>
+              </a:rPr>
+              <a:t>onstant </a:t>
+            </a:r>
+            <a:r>
               <a:rPr lang="en-US" sz="2000" dirty="0">
                 <a:cs typeface="Times New Roman" panose="02020603050405020304" pitchFamily="18" charset="0"/>
               </a:rPr>
-              <a:t>Lot of thinking before the actual work;</a:t>
-            </a:r>
-          </a:p>
-          <a:p>
-            <a:pPr marL="342900" indent="226800" algn="just">
-              <a:lnSpc>
-                <a:spcPct val="150000"/>
-              </a:lnSpc>
-              <a:buFont typeface="Courier New" charset="0"/>
-              <a:buChar char="o"/>
-            </a:pPr>
+              <a:t>management’s pressure </a:t>
+            </a:r>
+            <a:r>
+              <a:rPr lang="en-US" sz="2000" dirty="0" smtClean="0">
+                <a:cs typeface="Times New Roman" panose="02020603050405020304" pitchFamily="18" charset="0"/>
+              </a:rPr>
+              <a:t>on </a:t>
+            </a:r>
             <a:r>
               <a:rPr lang="en-US" sz="2000" dirty="0">
                 <a:cs typeface="Times New Roman" panose="02020603050405020304" pitchFamily="18" charset="0"/>
               </a:rPr>
-              <a:t>Constant management’s pressure to team members.</a:t>
-            </a:r>
-            <a:endParaRPr lang="en-US" sz="2000" dirty="0">
-              <a:cs typeface="Times New Roman" panose="02020603050405020304" pitchFamily="18" charset="0"/>
-            </a:endParaRPr>
+              <a:t>team members.</a:t>
+            </a:r>
           </a:p>
         </p:txBody>
       </p:sp>
@@ -6566,6 +7819,25 @@
   <p:clrMapOvr>
     <a:masterClrMapping/>
   </p:clrMapOvr>
+  <mc:AlternateContent xmlns:mc="http://schemas.openxmlformats.org/markup-compatibility/2006">
+    <mc:Choice xmlns:p14="http://schemas.microsoft.com/office/powerpoint/2010/main" Requires="p14">
+      <p:transition spd="med" p14:dur="700">
+        <p:fade/>
+      </p:transition>
+    </mc:Choice>
+    <mc:Fallback>
+      <p:transition spd="med">
+        <p:fade/>
+      </p:transition>
+    </mc:Fallback>
+  </mc:AlternateContent>
+  <p:timing>
+    <p:tnLst>
+      <p:par>
+        <p:cTn id="1" dur="indefinite" restart="never" nodeType="tmRoot"/>
+      </p:par>
+    </p:tnLst>
+  </p:timing>
 </p:sld>
 </file>
 

</xml_diff>